<commit_message>
Corrected small typos in slides
</commit_message>
<xml_diff>
--- a/LectureSlides/03b_WhenOneThingDependsOnAother.pptx
+++ b/LectureSlides/03b_WhenOneThingDependsOnAother.pptx
@@ -331,7 +331,7 @@
           <a:p>
             <a:fld id="{241EB5C9-1307-BA42-ABA2-0BC069CD8E7F}" type="datetimeFigureOut">
               <a:rPr lang="en-US" smtClean="0"/>
-              <a:t>9/7/2024</a:t>
+              <a:t>9/18/2024</a:t>
             </a:fld>
             <a:endParaRPr lang="en-US"/>
           </a:p>
@@ -499,7 +499,7 @@
           <a:p>
             <a:fld id="{241EB5C9-1307-BA42-ABA2-0BC069CD8E7F}" type="datetimeFigureOut">
               <a:rPr lang="en-US" smtClean="0"/>
-              <a:t>9/7/2024</a:t>
+              <a:t>9/18/2024</a:t>
             </a:fld>
             <a:endParaRPr lang="en-US"/>
           </a:p>
@@ -677,7 +677,7 @@
           <a:p>
             <a:fld id="{241EB5C9-1307-BA42-ABA2-0BC069CD8E7F}" type="datetimeFigureOut">
               <a:rPr lang="en-US" smtClean="0"/>
-              <a:t>9/7/2024</a:t>
+              <a:t>9/18/2024</a:t>
             </a:fld>
             <a:endParaRPr lang="en-US"/>
           </a:p>
@@ -845,7 +845,7 @@
           <a:p>
             <a:fld id="{241EB5C9-1307-BA42-ABA2-0BC069CD8E7F}" type="datetimeFigureOut">
               <a:rPr lang="en-US" smtClean="0"/>
-              <a:t>9/7/2024</a:t>
+              <a:t>9/18/2024</a:t>
             </a:fld>
             <a:endParaRPr lang="en-US"/>
           </a:p>
@@ -1090,7 +1090,7 @@
           <a:p>
             <a:fld id="{241EB5C9-1307-BA42-ABA2-0BC069CD8E7F}" type="datetimeFigureOut">
               <a:rPr lang="en-US" smtClean="0"/>
-              <a:t>9/7/2024</a:t>
+              <a:t>9/18/2024</a:t>
             </a:fld>
             <a:endParaRPr lang="en-US"/>
           </a:p>
@@ -1375,7 +1375,7 @@
           <a:p>
             <a:fld id="{241EB5C9-1307-BA42-ABA2-0BC069CD8E7F}" type="datetimeFigureOut">
               <a:rPr lang="en-US" smtClean="0"/>
-              <a:t>9/7/2024</a:t>
+              <a:t>9/18/2024</a:t>
             </a:fld>
             <a:endParaRPr lang="en-US"/>
           </a:p>
@@ -1794,7 +1794,7 @@
           <a:p>
             <a:fld id="{241EB5C9-1307-BA42-ABA2-0BC069CD8E7F}" type="datetimeFigureOut">
               <a:rPr lang="en-US" smtClean="0"/>
-              <a:t>9/7/2024</a:t>
+              <a:t>9/18/2024</a:t>
             </a:fld>
             <a:endParaRPr lang="en-US"/>
           </a:p>
@@ -1911,7 +1911,7 @@
           <a:p>
             <a:fld id="{241EB5C9-1307-BA42-ABA2-0BC069CD8E7F}" type="datetimeFigureOut">
               <a:rPr lang="en-US" smtClean="0"/>
-              <a:t>9/7/2024</a:t>
+              <a:t>9/18/2024</a:t>
             </a:fld>
             <a:endParaRPr lang="en-US"/>
           </a:p>
@@ -2006,7 +2006,7 @@
           <a:p>
             <a:fld id="{241EB5C9-1307-BA42-ABA2-0BC069CD8E7F}" type="datetimeFigureOut">
               <a:rPr lang="en-US" smtClean="0"/>
-              <a:t>9/7/2024</a:t>
+              <a:t>9/18/2024</a:t>
             </a:fld>
             <a:endParaRPr lang="en-US"/>
           </a:p>
@@ -2281,7 +2281,7 @@
           <a:p>
             <a:fld id="{241EB5C9-1307-BA42-ABA2-0BC069CD8E7F}" type="datetimeFigureOut">
               <a:rPr lang="en-US" smtClean="0"/>
-              <a:t>9/7/2024</a:t>
+              <a:t>9/18/2024</a:t>
             </a:fld>
             <a:endParaRPr lang="en-US"/>
           </a:p>
@@ -2533,7 +2533,7 @@
           <a:p>
             <a:fld id="{241EB5C9-1307-BA42-ABA2-0BC069CD8E7F}" type="datetimeFigureOut">
               <a:rPr lang="en-US" smtClean="0"/>
-              <a:t>9/7/2024</a:t>
+              <a:t>9/18/2024</a:t>
             </a:fld>
             <a:endParaRPr lang="en-US"/>
           </a:p>
@@ -2744,7 +2744,7 @@
           <a:p>
             <a:fld id="{241EB5C9-1307-BA42-ABA2-0BC069CD8E7F}" type="datetimeFigureOut">
               <a:rPr lang="en-US" smtClean="0"/>
-              <a:t>9/7/2024</a:t>
+              <a:t>9/18/2024</a:t>
             </a:fld>
             <a:endParaRPr lang="en-US"/>
           </a:p>
@@ -3351,8 +3351,8 @@
           </a:p>
         </p:txBody>
       </p:sp>
-      <mc:AlternateContent xmlns:mc="http://schemas.openxmlformats.org/markup-compatibility/2006">
-        <mc:Choice xmlns:a14="http://schemas.microsoft.com/office/drawing/2010/main" Requires="a14">
+      <mc:AlternateContent xmlns:mc="http://schemas.openxmlformats.org/markup-compatibility/2006" xmlns:a14="http://schemas.microsoft.com/office/drawing/2010/main">
+        <mc:Choice Requires="a14">
           <p:sp>
             <p:nvSpPr>
               <p:cNvPr id="3" name="Content Placeholder 2"/>
@@ -3861,7 +3861,7 @@
             </p:txBody>
           </p:sp>
         </mc:Choice>
-        <mc:Fallback>
+        <mc:Fallback xmlns="">
           <p:sp>
             <p:nvSpPr>
               <p:cNvPr id="3" name="Content Placeholder 2"/>
@@ -5025,8 +5025,8 @@
           </a:p>
         </p:txBody>
       </p:sp>
-      <mc:AlternateContent xmlns:mc="http://schemas.openxmlformats.org/markup-compatibility/2006">
-        <mc:Choice xmlns:a14="http://schemas.microsoft.com/office/drawing/2010/main" Requires="a14">
+      <mc:AlternateContent xmlns:mc="http://schemas.openxmlformats.org/markup-compatibility/2006" xmlns:a14="http://schemas.microsoft.com/office/drawing/2010/main">
+        <mc:Choice Requires="a14">
           <p:sp>
             <p:nvSpPr>
               <p:cNvPr id="3" name="Content Placeholder 2"/>
@@ -5449,7 +5449,7 @@
             </p:txBody>
           </p:sp>
         </mc:Choice>
-        <mc:Fallback>
+        <mc:Fallback xmlns="">
           <p:sp>
             <p:nvSpPr>
               <p:cNvPr id="3" name="Content Placeholder 2"/>
@@ -11596,8 +11596,8 @@
           </a:p>
         </p:txBody>
       </p:sp>
-      <mc:AlternateContent xmlns:mc="http://schemas.openxmlformats.org/markup-compatibility/2006" xmlns:a14="http://schemas.microsoft.com/office/drawing/2010/main">
-        <mc:Choice Requires="a14">
+      <mc:AlternateContent xmlns:mc="http://schemas.openxmlformats.org/markup-compatibility/2006">
+        <mc:Choice xmlns:a14="http://schemas.microsoft.com/office/drawing/2010/main" Requires="a14">
           <p:sp>
             <p:nvSpPr>
               <p:cNvPr id="3" name="Content Placeholder 2"/>
@@ -11639,7 +11639,15 @@
                 <a:pPr lvl="0"/>
                 <a:r>
                   <a:rPr lang="en-US" dirty="0"/>
-                  <a:t>The probability that a given patient, drawn at random from the population of all people in the United States, has the disease is </a:t>
+                  <a:t>The probability that a given patient, drawn at random from the population </a:t>
+                </a:r>
+                <a:r>
+                  <a:rPr lang="en-US"/>
+                  <a:t>of people </a:t>
+                </a:r>
+                <a:r>
+                  <a:rPr lang="en-US" dirty="0"/>
+                  <a:t>in the United States, has the disease is </a:t>
                 </a:r>
                 <a:endParaRPr lang="en-US" dirty="0">
                   <a:latin typeface="Cambria Math" panose="02040503050406030204" pitchFamily="18" charset="0"/>
@@ -11910,7 +11918,7 @@
             </p:txBody>
           </p:sp>
         </mc:Choice>
-        <mc:Fallback xmlns="">
+        <mc:Fallback>
           <p:sp>
             <p:nvSpPr>
               <p:cNvPr id="3" name="Content Placeholder 2"/>
@@ -14875,8 +14883,8 @@
           </a:p>
         </p:txBody>
       </p:sp>
-      <mc:AlternateContent xmlns:mc="http://schemas.openxmlformats.org/markup-compatibility/2006">
-        <mc:Choice xmlns:a14="http://schemas.microsoft.com/office/drawing/2010/main" Requires="a14">
+      <mc:AlternateContent xmlns:mc="http://schemas.openxmlformats.org/markup-compatibility/2006" xmlns:a14="http://schemas.microsoft.com/office/drawing/2010/main">
+        <mc:Choice Requires="a14">
           <p:sp>
             <p:nvSpPr>
               <p:cNvPr id="6" name="Content Placeholder 2"/>
@@ -15167,7 +15175,7 @@
             </p:txBody>
           </p:sp>
         </mc:Choice>
-        <mc:Fallback>
+        <mc:Fallback xmlns="">
           <p:sp>
             <p:nvSpPr>
               <p:cNvPr id="6" name="Content Placeholder 2"/>
@@ -15262,8 +15270,8 @@
           </a:p>
         </p:txBody>
       </p:sp>
-      <mc:AlternateContent xmlns:mc="http://schemas.openxmlformats.org/markup-compatibility/2006">
-        <mc:Choice xmlns:a14="http://schemas.microsoft.com/office/drawing/2010/main" Requires="a14">
+      <mc:AlternateContent xmlns:mc="http://schemas.openxmlformats.org/markup-compatibility/2006" xmlns:a14="http://schemas.microsoft.com/office/drawing/2010/main">
+        <mc:Choice Requires="a14">
           <p:sp>
             <p:nvSpPr>
               <p:cNvPr id="3" name="Content Placeholder 2"/>
@@ -15773,7 +15781,7 @@
             </p:txBody>
           </p:sp>
         </mc:Choice>
-        <mc:Fallback>
+        <mc:Fallback xmlns="">
           <p:sp>
             <p:nvSpPr>
               <p:cNvPr id="3" name="Content Placeholder 2"/>
@@ -17354,8 +17362,8 @@
           </a:p>
         </p:txBody>
       </p:sp>
-      <mc:AlternateContent xmlns:mc="http://schemas.openxmlformats.org/markup-compatibility/2006">
-        <mc:Choice xmlns:a14="http://schemas.microsoft.com/office/drawing/2010/main" Requires="a14">
+      <mc:AlternateContent xmlns:mc="http://schemas.openxmlformats.org/markup-compatibility/2006" xmlns:a14="http://schemas.microsoft.com/office/drawing/2010/main">
+        <mc:Choice Requires="a14">
           <p:sp>
             <p:nvSpPr>
               <p:cNvPr id="3" name="Content Placeholder 2"/>
@@ -17545,7 +17553,7 @@
             </p:txBody>
           </p:sp>
         </mc:Choice>
-        <mc:Fallback>
+        <mc:Fallback xmlns="">
           <p:sp>
             <p:nvSpPr>
               <p:cNvPr id="3" name="Content Placeholder 2"/>
@@ -17631,8 +17639,8 @@
           </a:p>
         </p:txBody>
       </p:sp>
-      <mc:AlternateContent xmlns:mc="http://schemas.openxmlformats.org/markup-compatibility/2006">
-        <mc:Choice xmlns:a14="http://schemas.microsoft.com/office/drawing/2010/main" Requires="a14">
+      <mc:AlternateContent xmlns:mc="http://schemas.openxmlformats.org/markup-compatibility/2006" xmlns:a14="http://schemas.microsoft.com/office/drawing/2010/main">
+        <mc:Choice Requires="a14">
           <p:sp>
             <p:nvSpPr>
               <p:cNvPr id="3" name="Content Placeholder 2"/>
@@ -18346,7 +18354,7 @@
             </p:txBody>
           </p:sp>
         </mc:Choice>
-        <mc:Fallback>
+        <mc:Fallback xmlns="">
           <p:sp>
             <p:nvSpPr>
               <p:cNvPr id="3" name="Content Placeholder 2"/>

</xml_diff>

<commit_message>
Updated Bayes theorem example
</commit_message>
<xml_diff>
--- a/LectureSlides/03b_WhenOneThingDependsOnAother.pptx
+++ b/LectureSlides/03b_WhenOneThingDependsOnAother.pptx
@@ -4,6 +4,9 @@
   <p:sldMasterIdLst>
     <p:sldMasterId id="2147483648" r:id="rId1"/>
   </p:sldMasterIdLst>
+  <p:notesMasterIdLst>
+    <p:notesMasterId r:id="rId32"/>
+  </p:notesMasterIdLst>
   <p:sldIdLst>
     <p:sldId id="299" r:id="rId2"/>
     <p:sldId id="257" r:id="rId3"/>
@@ -150,6 +153,439 @@
     </p:ext>
   </p:extLst>
 </p:presentation>
+</file>
+
+<file path=ppt/notesMasters/notesMaster1.xml><?xml version="1.0" encoding="utf-8"?>
+<p:notesMaster xmlns:a="http://schemas.openxmlformats.org/drawingml/2006/main" xmlns:r="http://schemas.openxmlformats.org/officeDocument/2006/relationships" xmlns:p="http://schemas.openxmlformats.org/presentationml/2006/main">
+  <p:cSld>
+    <p:bg>
+      <p:bgRef idx="1001">
+        <a:schemeClr val="bg1"/>
+      </p:bgRef>
+    </p:bg>
+    <p:spTree>
+      <p:nvGrpSpPr>
+        <p:cNvPr id="1" name=""/>
+        <p:cNvGrpSpPr/>
+        <p:nvPr/>
+      </p:nvGrpSpPr>
+      <p:grpSpPr>
+        <a:xfrm>
+          <a:off x="0" y="0"/>
+          <a:ext cx="0" cy="0"/>
+          <a:chOff x="0" y="0"/>
+          <a:chExt cx="0" cy="0"/>
+        </a:xfrm>
+      </p:grpSpPr>
+      <p:sp>
+        <p:nvSpPr>
+          <p:cNvPr id="2" name="Header Placeholder 1"/>
+          <p:cNvSpPr>
+            <a:spLocks noGrp="1"/>
+          </p:cNvSpPr>
+          <p:nvPr>
+            <p:ph type="hdr" sz="quarter"/>
+          </p:nvPr>
+        </p:nvSpPr>
+        <p:spPr>
+          <a:xfrm>
+            <a:off x="0" y="0"/>
+            <a:ext cx="2971800" cy="458788"/>
+          </a:xfrm>
+          <a:prstGeom prst="rect">
+            <a:avLst/>
+          </a:prstGeom>
+        </p:spPr>
+        <p:txBody>
+          <a:bodyPr vert="horz" lIns="91440" tIns="45720" rIns="91440" bIns="45720" rtlCol="0"/>
+          <a:lstStyle>
+            <a:lvl1pPr algn="l">
+              <a:defRPr sz="1200"/>
+            </a:lvl1pPr>
+          </a:lstStyle>
+          <a:p>
+            <a:endParaRPr lang="en-US"/>
+          </a:p>
+        </p:txBody>
+      </p:sp>
+      <p:sp>
+        <p:nvSpPr>
+          <p:cNvPr id="3" name="Date Placeholder 2"/>
+          <p:cNvSpPr>
+            <a:spLocks noGrp="1"/>
+          </p:cNvSpPr>
+          <p:nvPr>
+            <p:ph type="dt" idx="1"/>
+          </p:nvPr>
+        </p:nvSpPr>
+        <p:spPr>
+          <a:xfrm>
+            <a:off x="3884613" y="0"/>
+            <a:ext cx="2971800" cy="458788"/>
+          </a:xfrm>
+          <a:prstGeom prst="rect">
+            <a:avLst/>
+          </a:prstGeom>
+        </p:spPr>
+        <p:txBody>
+          <a:bodyPr vert="horz" lIns="91440" tIns="45720" rIns="91440" bIns="45720" rtlCol="0"/>
+          <a:lstStyle>
+            <a:lvl1pPr algn="r">
+              <a:defRPr sz="1200"/>
+            </a:lvl1pPr>
+          </a:lstStyle>
+          <a:p>
+            <a:fld id="{4A4A0935-8C25-438A-84D4-96B1DB833474}" type="datetimeFigureOut">
+              <a:rPr lang="en-US" smtClean="0"/>
+              <a:t>10/3/2024</a:t>
+            </a:fld>
+            <a:endParaRPr lang="en-US"/>
+          </a:p>
+        </p:txBody>
+      </p:sp>
+      <p:sp>
+        <p:nvSpPr>
+          <p:cNvPr id="4" name="Slide Image Placeholder 3"/>
+          <p:cNvSpPr>
+            <a:spLocks noGrp="1" noRot="1" noChangeAspect="1"/>
+          </p:cNvSpPr>
+          <p:nvPr>
+            <p:ph type="sldImg" idx="2"/>
+          </p:nvPr>
+        </p:nvSpPr>
+        <p:spPr>
+          <a:xfrm>
+            <a:off x="685800" y="1143000"/>
+            <a:ext cx="5486400" cy="3086100"/>
+          </a:xfrm>
+          <a:prstGeom prst="rect">
+            <a:avLst/>
+          </a:prstGeom>
+          <a:noFill/>
+          <a:ln w="12700">
+            <a:solidFill>
+              <a:prstClr val="black"/>
+            </a:solidFill>
+          </a:ln>
+        </p:spPr>
+        <p:txBody>
+          <a:bodyPr vert="horz" lIns="91440" tIns="45720" rIns="91440" bIns="45720" rtlCol="0" anchor="ctr"/>
+          <a:lstStyle/>
+          <a:p>
+            <a:endParaRPr lang="en-US"/>
+          </a:p>
+        </p:txBody>
+      </p:sp>
+      <p:sp>
+        <p:nvSpPr>
+          <p:cNvPr id="5" name="Notes Placeholder 4"/>
+          <p:cNvSpPr>
+            <a:spLocks noGrp="1"/>
+          </p:cNvSpPr>
+          <p:nvPr>
+            <p:ph type="body" sz="quarter" idx="3"/>
+          </p:nvPr>
+        </p:nvSpPr>
+        <p:spPr>
+          <a:xfrm>
+            <a:off x="685800" y="4400550"/>
+            <a:ext cx="5486400" cy="3600450"/>
+          </a:xfrm>
+          <a:prstGeom prst="rect">
+            <a:avLst/>
+          </a:prstGeom>
+        </p:spPr>
+        <p:txBody>
+          <a:bodyPr vert="horz" lIns="91440" tIns="45720" rIns="91440" bIns="45720" rtlCol="0"/>
+          <a:lstStyle/>
+          <a:p>
+            <a:pPr lvl="0"/>
+            <a:r>
+              <a:rPr lang="en-US"/>
+              <a:t>Click to edit Master text styles</a:t>
+            </a:r>
+          </a:p>
+          <a:p>
+            <a:pPr lvl="1"/>
+            <a:r>
+              <a:rPr lang="en-US"/>
+              <a:t>Second level</a:t>
+            </a:r>
+          </a:p>
+          <a:p>
+            <a:pPr lvl="2"/>
+            <a:r>
+              <a:rPr lang="en-US"/>
+              <a:t>Third level</a:t>
+            </a:r>
+          </a:p>
+          <a:p>
+            <a:pPr lvl="3"/>
+            <a:r>
+              <a:rPr lang="en-US"/>
+              <a:t>Fourth level</a:t>
+            </a:r>
+          </a:p>
+          <a:p>
+            <a:pPr lvl="4"/>
+            <a:r>
+              <a:rPr lang="en-US"/>
+              <a:t>Fifth level</a:t>
+            </a:r>
+          </a:p>
+        </p:txBody>
+      </p:sp>
+      <p:sp>
+        <p:nvSpPr>
+          <p:cNvPr id="6" name="Footer Placeholder 5"/>
+          <p:cNvSpPr>
+            <a:spLocks noGrp="1"/>
+          </p:cNvSpPr>
+          <p:nvPr>
+            <p:ph type="ftr" sz="quarter" idx="4"/>
+          </p:nvPr>
+        </p:nvSpPr>
+        <p:spPr>
+          <a:xfrm>
+            <a:off x="0" y="8685213"/>
+            <a:ext cx="2971800" cy="458787"/>
+          </a:xfrm>
+          <a:prstGeom prst="rect">
+            <a:avLst/>
+          </a:prstGeom>
+        </p:spPr>
+        <p:txBody>
+          <a:bodyPr vert="horz" lIns="91440" tIns="45720" rIns="91440" bIns="45720" rtlCol="0" anchor="b"/>
+          <a:lstStyle>
+            <a:lvl1pPr algn="l">
+              <a:defRPr sz="1200"/>
+            </a:lvl1pPr>
+          </a:lstStyle>
+          <a:p>
+            <a:endParaRPr lang="en-US"/>
+          </a:p>
+        </p:txBody>
+      </p:sp>
+      <p:sp>
+        <p:nvSpPr>
+          <p:cNvPr id="7" name="Slide Number Placeholder 6"/>
+          <p:cNvSpPr>
+            <a:spLocks noGrp="1"/>
+          </p:cNvSpPr>
+          <p:nvPr>
+            <p:ph type="sldNum" sz="quarter" idx="5"/>
+          </p:nvPr>
+        </p:nvSpPr>
+        <p:spPr>
+          <a:xfrm>
+            <a:off x="3884613" y="8685213"/>
+            <a:ext cx="2971800" cy="458787"/>
+          </a:xfrm>
+          <a:prstGeom prst="rect">
+            <a:avLst/>
+          </a:prstGeom>
+        </p:spPr>
+        <p:txBody>
+          <a:bodyPr vert="horz" lIns="91440" tIns="45720" rIns="91440" bIns="45720" rtlCol="0" anchor="b"/>
+          <a:lstStyle>
+            <a:lvl1pPr algn="r">
+              <a:defRPr sz="1200"/>
+            </a:lvl1pPr>
+          </a:lstStyle>
+          <a:p>
+            <a:fld id="{083B5FD2-BF1D-4323-8242-C1E03AB0C2D9}" type="slidenum">
+              <a:rPr lang="en-US" smtClean="0"/>
+              <a:t>‹#›</a:t>
+            </a:fld>
+            <a:endParaRPr lang="en-US"/>
+          </a:p>
+        </p:txBody>
+      </p:sp>
+    </p:spTree>
+    <p:extLst>
+      <p:ext uri="{BB962C8B-B14F-4D97-AF65-F5344CB8AC3E}">
+        <p14:creationId xmlns:p14="http://schemas.microsoft.com/office/powerpoint/2010/main" val="2910386748"/>
+      </p:ext>
+    </p:extLst>
+  </p:cSld>
+  <p:clrMap bg1="lt1" tx1="dk1" bg2="lt2" tx2="dk2" accent1="accent1" accent2="accent2" accent3="accent3" accent4="accent4" accent5="accent5" accent6="accent6" hlink="hlink" folHlink="folHlink"/>
+  <p:notesStyle>
+    <a:lvl1pPr marL="0" algn="l" defTabSz="914400" rtl="0" eaLnBrk="1" latinLnBrk="0" hangingPunct="1">
+      <a:defRPr sz="1200" kern="1200">
+        <a:solidFill>
+          <a:schemeClr val="tx1"/>
+        </a:solidFill>
+        <a:latin typeface="+mn-lt"/>
+        <a:ea typeface="+mn-ea"/>
+        <a:cs typeface="+mn-cs"/>
+      </a:defRPr>
+    </a:lvl1pPr>
+    <a:lvl2pPr marL="457200" algn="l" defTabSz="914400" rtl="0" eaLnBrk="1" latinLnBrk="0" hangingPunct="1">
+      <a:defRPr sz="1200" kern="1200">
+        <a:solidFill>
+          <a:schemeClr val="tx1"/>
+        </a:solidFill>
+        <a:latin typeface="+mn-lt"/>
+        <a:ea typeface="+mn-ea"/>
+        <a:cs typeface="+mn-cs"/>
+      </a:defRPr>
+    </a:lvl2pPr>
+    <a:lvl3pPr marL="914400" algn="l" defTabSz="914400" rtl="0" eaLnBrk="1" latinLnBrk="0" hangingPunct="1">
+      <a:defRPr sz="1200" kern="1200">
+        <a:solidFill>
+          <a:schemeClr val="tx1"/>
+        </a:solidFill>
+        <a:latin typeface="+mn-lt"/>
+        <a:ea typeface="+mn-ea"/>
+        <a:cs typeface="+mn-cs"/>
+      </a:defRPr>
+    </a:lvl3pPr>
+    <a:lvl4pPr marL="1371600" algn="l" defTabSz="914400" rtl="0" eaLnBrk="1" latinLnBrk="0" hangingPunct="1">
+      <a:defRPr sz="1200" kern="1200">
+        <a:solidFill>
+          <a:schemeClr val="tx1"/>
+        </a:solidFill>
+        <a:latin typeface="+mn-lt"/>
+        <a:ea typeface="+mn-ea"/>
+        <a:cs typeface="+mn-cs"/>
+      </a:defRPr>
+    </a:lvl4pPr>
+    <a:lvl5pPr marL="1828800" algn="l" defTabSz="914400" rtl="0" eaLnBrk="1" latinLnBrk="0" hangingPunct="1">
+      <a:defRPr sz="1200" kern="1200">
+        <a:solidFill>
+          <a:schemeClr val="tx1"/>
+        </a:solidFill>
+        <a:latin typeface="+mn-lt"/>
+        <a:ea typeface="+mn-ea"/>
+        <a:cs typeface="+mn-cs"/>
+      </a:defRPr>
+    </a:lvl5pPr>
+    <a:lvl6pPr marL="2286000" algn="l" defTabSz="914400" rtl="0" eaLnBrk="1" latinLnBrk="0" hangingPunct="1">
+      <a:defRPr sz="1200" kern="1200">
+        <a:solidFill>
+          <a:schemeClr val="tx1"/>
+        </a:solidFill>
+        <a:latin typeface="+mn-lt"/>
+        <a:ea typeface="+mn-ea"/>
+        <a:cs typeface="+mn-cs"/>
+      </a:defRPr>
+    </a:lvl6pPr>
+    <a:lvl7pPr marL="2743200" algn="l" defTabSz="914400" rtl="0" eaLnBrk="1" latinLnBrk="0" hangingPunct="1">
+      <a:defRPr sz="1200" kern="1200">
+        <a:solidFill>
+          <a:schemeClr val="tx1"/>
+        </a:solidFill>
+        <a:latin typeface="+mn-lt"/>
+        <a:ea typeface="+mn-ea"/>
+        <a:cs typeface="+mn-cs"/>
+      </a:defRPr>
+    </a:lvl7pPr>
+    <a:lvl8pPr marL="3200400" algn="l" defTabSz="914400" rtl="0" eaLnBrk="1" latinLnBrk="0" hangingPunct="1">
+      <a:defRPr sz="1200" kern="1200">
+        <a:solidFill>
+          <a:schemeClr val="tx1"/>
+        </a:solidFill>
+        <a:latin typeface="+mn-lt"/>
+        <a:ea typeface="+mn-ea"/>
+        <a:cs typeface="+mn-cs"/>
+      </a:defRPr>
+    </a:lvl8pPr>
+    <a:lvl9pPr marL="3657600" algn="l" defTabSz="914400" rtl="0" eaLnBrk="1" latinLnBrk="0" hangingPunct="1">
+      <a:defRPr sz="1200" kern="1200">
+        <a:solidFill>
+          <a:schemeClr val="tx1"/>
+        </a:solidFill>
+        <a:latin typeface="+mn-lt"/>
+        <a:ea typeface="+mn-ea"/>
+        <a:cs typeface="+mn-cs"/>
+      </a:defRPr>
+    </a:lvl9pPr>
+  </p:notesStyle>
+</p:notesMaster>
+</file>
+
+<file path=ppt/notesSlides/notesSlide1.xml><?xml version="1.0" encoding="utf-8"?>
+<p:notes xmlns:a="http://schemas.openxmlformats.org/drawingml/2006/main" xmlns:r="http://schemas.openxmlformats.org/officeDocument/2006/relationships" xmlns:p="http://schemas.openxmlformats.org/presentationml/2006/main">
+  <p:cSld>
+    <p:spTree>
+      <p:nvGrpSpPr>
+        <p:cNvPr id="1" name=""/>
+        <p:cNvGrpSpPr/>
+        <p:nvPr/>
+      </p:nvGrpSpPr>
+      <p:grpSpPr>
+        <a:xfrm>
+          <a:off x="0" y="0"/>
+          <a:ext cx="0" cy="0"/>
+          <a:chOff x="0" y="0"/>
+          <a:chExt cx="0" cy="0"/>
+        </a:xfrm>
+      </p:grpSpPr>
+      <p:sp>
+        <p:nvSpPr>
+          <p:cNvPr id="2" name="Slide Image Placeholder 1"/>
+          <p:cNvSpPr>
+            <a:spLocks noGrp="1" noRot="1" noChangeAspect="1"/>
+          </p:cNvSpPr>
+          <p:nvPr>
+            <p:ph type="sldImg"/>
+          </p:nvPr>
+        </p:nvSpPr>
+        <p:spPr/>
+      </p:sp>
+      <p:sp>
+        <p:nvSpPr>
+          <p:cNvPr id="3" name="Notes Placeholder 2"/>
+          <p:cNvSpPr>
+            <a:spLocks noGrp="1"/>
+          </p:cNvSpPr>
+          <p:nvPr>
+            <p:ph type="body" idx="1"/>
+          </p:nvPr>
+        </p:nvSpPr>
+        <p:spPr/>
+        <p:txBody>
+          <a:bodyPr/>
+          <a:lstStyle/>
+          <a:p>
+            <a:endParaRPr lang="en-US" dirty="0"/>
+          </a:p>
+        </p:txBody>
+      </p:sp>
+      <p:sp>
+        <p:nvSpPr>
+          <p:cNvPr id="4" name="Slide Number Placeholder 3"/>
+          <p:cNvSpPr>
+            <a:spLocks noGrp="1"/>
+          </p:cNvSpPr>
+          <p:nvPr>
+            <p:ph type="sldNum" sz="quarter" idx="5"/>
+          </p:nvPr>
+        </p:nvSpPr>
+        <p:spPr/>
+        <p:txBody>
+          <a:bodyPr/>
+          <a:lstStyle/>
+          <a:p>
+            <a:fld id="{083B5FD2-BF1D-4323-8242-C1E03AB0C2D9}" type="slidenum">
+              <a:rPr lang="en-US" smtClean="0"/>
+              <a:t>17</a:t>
+            </a:fld>
+            <a:endParaRPr lang="en-US"/>
+          </a:p>
+        </p:txBody>
+      </p:sp>
+    </p:spTree>
+    <p:extLst>
+      <p:ext uri="{BB962C8B-B14F-4D97-AF65-F5344CB8AC3E}">
+        <p14:creationId xmlns:p14="http://schemas.microsoft.com/office/powerpoint/2010/main" val="1786095114"/>
+      </p:ext>
+    </p:extLst>
+  </p:cSld>
+  <p:clrMapOvr>
+    <a:masterClrMapping/>
+  </p:clrMapOvr>
+</p:notes>
 </file>
 
 <file path=ppt/slideLayouts/slideLayout1.xml><?xml version="1.0" encoding="utf-8"?>
@@ -331,7 +767,7 @@
           <a:p>
             <a:fld id="{241EB5C9-1307-BA42-ABA2-0BC069CD8E7F}" type="datetimeFigureOut">
               <a:rPr lang="en-US" smtClean="0"/>
-              <a:t>9/18/2024</a:t>
+              <a:t>10/3/2024</a:t>
             </a:fld>
             <a:endParaRPr lang="en-US"/>
           </a:p>
@@ -499,7 +935,7 @@
           <a:p>
             <a:fld id="{241EB5C9-1307-BA42-ABA2-0BC069CD8E7F}" type="datetimeFigureOut">
               <a:rPr lang="en-US" smtClean="0"/>
-              <a:t>9/18/2024</a:t>
+              <a:t>10/3/2024</a:t>
             </a:fld>
             <a:endParaRPr lang="en-US"/>
           </a:p>
@@ -677,7 +1113,7 @@
           <a:p>
             <a:fld id="{241EB5C9-1307-BA42-ABA2-0BC069CD8E7F}" type="datetimeFigureOut">
               <a:rPr lang="en-US" smtClean="0"/>
-              <a:t>9/18/2024</a:t>
+              <a:t>10/3/2024</a:t>
             </a:fld>
             <a:endParaRPr lang="en-US"/>
           </a:p>
@@ -845,7 +1281,7 @@
           <a:p>
             <a:fld id="{241EB5C9-1307-BA42-ABA2-0BC069CD8E7F}" type="datetimeFigureOut">
               <a:rPr lang="en-US" smtClean="0"/>
-              <a:t>9/18/2024</a:t>
+              <a:t>10/3/2024</a:t>
             </a:fld>
             <a:endParaRPr lang="en-US"/>
           </a:p>
@@ -1090,7 +1526,7 @@
           <a:p>
             <a:fld id="{241EB5C9-1307-BA42-ABA2-0BC069CD8E7F}" type="datetimeFigureOut">
               <a:rPr lang="en-US" smtClean="0"/>
-              <a:t>9/18/2024</a:t>
+              <a:t>10/3/2024</a:t>
             </a:fld>
             <a:endParaRPr lang="en-US"/>
           </a:p>
@@ -1375,7 +1811,7 @@
           <a:p>
             <a:fld id="{241EB5C9-1307-BA42-ABA2-0BC069CD8E7F}" type="datetimeFigureOut">
               <a:rPr lang="en-US" smtClean="0"/>
-              <a:t>9/18/2024</a:t>
+              <a:t>10/3/2024</a:t>
             </a:fld>
             <a:endParaRPr lang="en-US"/>
           </a:p>
@@ -1794,7 +2230,7 @@
           <a:p>
             <a:fld id="{241EB5C9-1307-BA42-ABA2-0BC069CD8E7F}" type="datetimeFigureOut">
               <a:rPr lang="en-US" smtClean="0"/>
-              <a:t>9/18/2024</a:t>
+              <a:t>10/3/2024</a:t>
             </a:fld>
             <a:endParaRPr lang="en-US"/>
           </a:p>
@@ -1911,7 +2347,7 @@
           <a:p>
             <a:fld id="{241EB5C9-1307-BA42-ABA2-0BC069CD8E7F}" type="datetimeFigureOut">
               <a:rPr lang="en-US" smtClean="0"/>
-              <a:t>9/18/2024</a:t>
+              <a:t>10/3/2024</a:t>
             </a:fld>
             <a:endParaRPr lang="en-US"/>
           </a:p>
@@ -2006,7 +2442,7 @@
           <a:p>
             <a:fld id="{241EB5C9-1307-BA42-ABA2-0BC069CD8E7F}" type="datetimeFigureOut">
               <a:rPr lang="en-US" smtClean="0"/>
-              <a:t>9/18/2024</a:t>
+              <a:t>10/3/2024</a:t>
             </a:fld>
             <a:endParaRPr lang="en-US"/>
           </a:p>
@@ -2281,7 +2717,7 @@
           <a:p>
             <a:fld id="{241EB5C9-1307-BA42-ABA2-0BC069CD8E7F}" type="datetimeFigureOut">
               <a:rPr lang="en-US" smtClean="0"/>
-              <a:t>9/18/2024</a:t>
+              <a:t>10/3/2024</a:t>
             </a:fld>
             <a:endParaRPr lang="en-US"/>
           </a:p>
@@ -2533,7 +2969,7 @@
           <a:p>
             <a:fld id="{241EB5C9-1307-BA42-ABA2-0BC069CD8E7F}" type="datetimeFigureOut">
               <a:rPr lang="en-US" smtClean="0"/>
-              <a:t>9/18/2024</a:t>
+              <a:t>10/3/2024</a:t>
             </a:fld>
             <a:endParaRPr lang="en-US"/>
           </a:p>
@@ -2744,7 +3180,7 @@
           <a:p>
             <a:fld id="{241EB5C9-1307-BA42-ABA2-0BC069CD8E7F}" type="datetimeFigureOut">
               <a:rPr lang="en-US" smtClean="0"/>
-              <a:t>9/18/2024</a:t>
+              <a:t>10/3/2024</a:t>
             </a:fld>
             <a:endParaRPr lang="en-US"/>
           </a:p>
@@ -6265,8 +6701,8 @@
           </a:p>
         </p:txBody>
       </p:sp>
-      <mc:AlternateContent xmlns:mc="http://schemas.openxmlformats.org/markup-compatibility/2006" xmlns:a14="http://schemas.microsoft.com/office/drawing/2010/main">
-        <mc:Choice Requires="a14">
+      <mc:AlternateContent xmlns:mc="http://schemas.openxmlformats.org/markup-compatibility/2006">
+        <mc:Choice xmlns:a14="http://schemas.microsoft.com/office/drawing/2010/main" Requires="a14">
           <p:sp>
             <p:nvSpPr>
               <p:cNvPr id="3" name="Content Placeholder 2"/>
@@ -6279,13 +6715,13 @@
             </p:nvSpPr>
             <p:spPr>
               <a:xfrm>
-                <a:off x="457200" y="1200151"/>
-                <a:ext cx="8229600" cy="3622634"/>
+                <a:off x="510032" y="1018525"/>
+                <a:ext cx="8229600" cy="4041155"/>
               </a:xfrm>
             </p:spPr>
             <p:txBody>
               <a:bodyPr>
-                <a:normAutofit fontScale="77500" lnSpcReduction="20000"/>
+                <a:normAutofit fontScale="70000" lnSpcReduction="20000"/>
               </a:bodyPr>
               <a:lstStyle/>
               <a:p>
@@ -6293,104 +6729,99 @@
                   <a:buNone/>
                 </a:pPr>
                 <a:r>
-                  <a:rPr dirty="0"/>
+                  <a:rPr lang="en-US" dirty="0"/>
                   <a:t>Hemophilia is a serious genetic condition expressed on any X chromosome</a:t>
                 </a:r>
               </a:p>
               <a:p>
                 <a:pPr lvl="0"/>
                 <a:r>
-                  <a:rPr dirty="0"/>
+                  <a:rPr lang="en-US" dirty="0"/>
                   <a:t>Women have two X chromosomes and are unlikely to exhibit hemophilia</a:t>
                 </a:r>
               </a:p>
               <a:p>
                 <a:pPr lvl="1"/>
                 <a:r>
-                  <a:rPr dirty="0"/>
+                  <a:rPr lang="en-US" sz="2300" dirty="0"/>
                   <a:t>One X chromosome inherited from each parent</a:t>
                 </a:r>
               </a:p>
               <a:p>
                 <a:pPr lvl="1"/>
                 <a:r>
-                  <a:rPr dirty="0"/>
-                  <a:t>Must inherit hemophilia from both parents</a:t>
-                </a:r>
+                  <a:rPr lang="en-US" sz="2300" dirty="0"/>
+                  <a:t>Must inherit hemophilia from both parents – very low probability</a:t>
+                </a:r>
+              </a:p>
+              <a:p>
+                <a:pPr lvl="0"/>
                 <a:r>
                   <a:rPr lang="en-US" dirty="0"/>
-                  <a:t> – very low probability</a:t>
-                </a:r>
-                <a:endParaRPr dirty="0"/>
+                  <a:t>Men have one X chromosome and one Y chromosome</a:t>
+                </a:r>
+              </a:p>
+              <a:p>
+                <a:pPr lvl="1"/>
+                <a:r>
+                  <a:rPr lang="en-US" sz="2300" dirty="0"/>
+                  <a:t>Inherit Y chromosome from the father</a:t>
+                </a:r>
+              </a:p>
+              <a:p>
+                <a:pPr lvl="1"/>
+                <a:r>
+                  <a:rPr lang="en-US" sz="2300" dirty="0"/>
+                  <a:t>Inherit X chromosome, and possibly hemophilia, from the mother</a:t>
+                </a:r>
               </a:p>
               <a:p>
                 <a:pPr lvl="0"/>
                 <a:r>
-                  <a:rPr dirty="0"/>
-                  <a:t>Men have one X chromosome and one Y chromosome</a:t>
+                  <a:rPr lang="en-US" dirty="0"/>
+                  <a:t>Say a woman has a brother who exhibits hemophilia</a:t>
                 </a:r>
               </a:p>
               <a:p>
                 <a:pPr lvl="1"/>
                 <a:r>
-                  <a:rPr dirty="0"/>
-                  <a:t>Inherit Y chromosome from the father</a:t>
-                </a:r>
-              </a:p>
-              <a:p>
-                <a:pPr lvl="1"/>
-                <a:r>
-                  <a:rPr dirty="0"/>
-                  <a:t>Inherit X chromosome, and possibly hemophilia, from the mother</a:t>
-                </a:r>
-              </a:p>
-              <a:p>
-                <a:pPr lvl="0"/>
-                <a:r>
-                  <a:rPr dirty="0"/>
-                  <a:t>Say a woman has a brother who exhibits hemophilia</a:t>
-                </a:r>
-              </a:p>
-              <a:p>
-                <a:pPr lvl="1"/>
-                <a:r>
-                  <a:rPr dirty="0"/>
-                  <a:t>X chromosome expression is </a:t>
+                  <a:rPr lang="en-US" sz="2300" dirty="0"/>
+                  <a:t>X chromosome expression for woman’s mother is </a:t>
                 </a:r>
                 <a14:m>
                   <m:oMath xmlns:m="http://schemas.openxmlformats.org/officeDocument/2006/math">
                     <m:r>
-                      <a:rPr>
+                      <a:rPr lang="en-US" sz="2300">
                         <a:latin typeface="Cambria Math" panose="02040503050406030204" pitchFamily="18" charset="0"/>
                       </a:rPr>
                       <m:t>𝜃</m:t>
                     </m:r>
                     <m:r>
-                      <a:rPr>
+                      <a:rPr lang="en-US" sz="2300">
                         <a:latin typeface="Cambria Math" panose="02040503050406030204" pitchFamily="18" charset="0"/>
                       </a:rPr>
                       <m:t>=</m:t>
                     </m:r>
                     <m:r>
-                      <a:rPr>
+                      <a:rPr lang="en-US" sz="2300">
                         <a:latin typeface="Cambria Math" panose="02040503050406030204" pitchFamily="18" charset="0"/>
                       </a:rPr>
                       <m:t>1</m:t>
                     </m:r>
                     <m:r>
-                      <a:rPr>
+                      <a:rPr lang="en-US" sz="2300">
                         <a:latin typeface="Cambria Math" panose="02040503050406030204" pitchFamily="18" charset="0"/>
                       </a:rPr>
                       <m:t>.</m:t>
                     </m:r>
                     <m:r>
-                      <a:rPr>
+                      <a:rPr lang="en-US" sz="2300">
                         <a:latin typeface="Cambria Math" panose="02040503050406030204" pitchFamily="18" charset="0"/>
                       </a:rPr>
                       <m:t>0</m:t>
                     </m:r>
                     <m:r>
-                      <a:rPr>
+                      <a:rPr lang="en-US" sz="2300">
                         <a:latin typeface="Cambria Math" panose="02040503050406030204" pitchFamily="18" charset="0"/>
                       </a:rPr>
                       <m:t>→</m:t>
@@ -6398,73 +6829,73 @@
                   </m:oMath>
                 </a14:m>
                 <a:r>
-                  <a:rPr dirty="0"/>
+                  <a:rPr lang="en-US" sz="2300" dirty="0"/>
                   <a:t> brother has hemophilia with </a:t>
                 </a:r>
                 <a14:m>
                   <m:oMath xmlns:m="http://schemas.openxmlformats.org/officeDocument/2006/math">
                     <m:r>
-                      <a:rPr>
+                      <a:rPr lang="en-US" sz="2300">
                         <a:latin typeface="Cambria Math" panose="02040503050406030204" pitchFamily="18" charset="0"/>
                       </a:rPr>
                       <m:t>𝑃</m:t>
                     </m:r>
                     <m:r>
-                      <a:rPr>
+                      <a:rPr lang="en-US" sz="2300">
                         <a:latin typeface="Cambria Math" panose="02040503050406030204" pitchFamily="18" charset="0"/>
                       </a:rPr>
                       <m:t>=</m:t>
                     </m:r>
                     <m:r>
-                      <a:rPr>
+                      <a:rPr lang="en-US" sz="2300">
                         <a:latin typeface="Cambria Math" panose="02040503050406030204" pitchFamily="18" charset="0"/>
                       </a:rPr>
                       <m:t>1</m:t>
                     </m:r>
                     <m:r>
-                      <a:rPr>
+                      <a:rPr lang="en-US" sz="2300">
                         <a:latin typeface="Cambria Math" panose="02040503050406030204" pitchFamily="18" charset="0"/>
                       </a:rPr>
                       <m:t>.</m:t>
                     </m:r>
                     <m:r>
-                      <a:rPr>
+                      <a:rPr lang="en-US" sz="2300">
                         <a:latin typeface="Cambria Math" panose="02040503050406030204" pitchFamily="18" charset="0"/>
                       </a:rPr>
                       <m:t>0</m:t>
                     </m:r>
                   </m:oMath>
                 </a14:m>
-                <a:endParaRPr dirty="0"/>
+                <a:endParaRPr lang="en-US" sz="2300" dirty="0"/>
               </a:p>
               <a:p>
                 <a:pPr lvl="1"/>
                 <a:r>
-                  <a:rPr dirty="0"/>
+                  <a:rPr lang="en-US" sz="2300" dirty="0"/>
                   <a:t>Woman’s father does not exhibit hemophilia, </a:t>
                 </a:r>
                 <a14:m>
                   <m:oMath xmlns:m="http://schemas.openxmlformats.org/officeDocument/2006/math">
                     <m:r>
-                      <a:rPr>
+                      <a:rPr lang="en-US" sz="2300">
                         <a:latin typeface="Cambria Math" panose="02040503050406030204" pitchFamily="18" charset="0"/>
                       </a:rPr>
                       <m:t>𝜃</m:t>
                     </m:r>
                     <m:r>
-                      <a:rPr>
+                      <a:rPr lang="en-US" sz="2300">
                         <a:latin typeface="Cambria Math" panose="02040503050406030204" pitchFamily="18" charset="0"/>
                       </a:rPr>
                       <m:t>=</m:t>
                     </m:r>
                     <m:r>
-                      <a:rPr>
+                      <a:rPr lang="en-US" sz="2300">
                         <a:latin typeface="Cambria Math" panose="02040503050406030204" pitchFamily="18" charset="0"/>
                       </a:rPr>
                       <m:t>0</m:t>
                     </m:r>
                     <m:r>
-                      <a:rPr>
+                      <a:rPr lang="en-US" sz="2300">
                         <a:latin typeface="Cambria Math" panose="02040503050406030204" pitchFamily="18" charset="0"/>
                       </a:rPr>
                       <m:t>→</m:t>
@@ -6472,135 +6903,325 @@
                   </m:oMath>
                 </a14:m>
                 <a:r>
-                  <a:rPr dirty="0"/>
+                  <a:rPr lang="en-US" sz="2300" dirty="0"/>
                   <a:t> father has hemophilia with </a:t>
                 </a:r>
                 <a14:m>
                   <m:oMath xmlns:m="http://schemas.openxmlformats.org/officeDocument/2006/math">
                     <m:r>
-                      <a:rPr>
+                      <a:rPr lang="en-US" sz="2300">
                         <a:latin typeface="Cambria Math" panose="02040503050406030204" pitchFamily="18" charset="0"/>
                       </a:rPr>
                       <m:t>𝑃</m:t>
                     </m:r>
                     <m:r>
-                      <a:rPr>
+                      <a:rPr lang="en-US" sz="2300">
                         <a:latin typeface="Cambria Math" panose="02040503050406030204" pitchFamily="18" charset="0"/>
                       </a:rPr>
                       <m:t>=</m:t>
                     </m:r>
                     <m:r>
-                      <a:rPr>
+                      <a:rPr lang="en-US" sz="2300">
                         <a:latin typeface="Cambria Math" panose="02040503050406030204" pitchFamily="18" charset="0"/>
                       </a:rPr>
                       <m:t>0</m:t>
                     </m:r>
                     <m:r>
-                      <a:rPr>
+                      <a:rPr lang="en-US" sz="2300">
                         <a:latin typeface="Cambria Math" panose="02040503050406030204" pitchFamily="18" charset="0"/>
                       </a:rPr>
                       <m:t>.</m:t>
                     </m:r>
                     <m:r>
-                      <a:rPr>
+                      <a:rPr lang="en-US" sz="2300">
                         <a:latin typeface="Cambria Math" panose="02040503050406030204" pitchFamily="18" charset="0"/>
                       </a:rPr>
                       <m:t>0</m:t>
                     </m:r>
                   </m:oMath>
                 </a14:m>
-                <a:endParaRPr dirty="0"/>
-              </a:p>
-              <a:p>
-                <a:pPr lvl="1"/>
-                <a:r>
-                  <a:rPr dirty="0"/>
-                  <a:t>Our prior probability that she carries the genetic marker for hemophilia </a:t>
-                </a:r>
+                <a:endParaRPr lang="en-US" sz="2300" dirty="0"/>
+              </a:p>
+              <a:p>
+                <a:r>
+                  <a:rPr lang="en-US" sz="2600" dirty="0"/>
+                  <a:t>Our </a:t>
+                </a:r>
+                <a:r>
+                  <a:rPr lang="en-US" sz="2600" b="1" dirty="0"/>
+                  <a:t>prior belief </a:t>
+                </a:r>
+                <a:r>
+                  <a:rPr lang="en-US" sz="2600" dirty="0"/>
+                  <a:t>that woman carries the genetic marker for hemophilia given parents</a:t>
+                </a:r>
+              </a:p>
+              <a:p>
+                <a:pPr marL="342900" lvl="1" indent="0">
+                  <a:buNone/>
+                </a:pPr>
                 <a14:m>
-                  <m:oMath xmlns:m="http://schemas.openxmlformats.org/officeDocument/2006/math">
-                    <m:r>
-                      <a:rPr>
-                        <a:latin typeface="Cambria Math" panose="02040503050406030204" pitchFamily="18" charset="0"/>
-                      </a:rPr>
-                      <m:t>𝜃</m:t>
-                    </m:r>
-                    <m:r>
-                      <a:rPr>
-                        <a:latin typeface="Cambria Math" panose="02040503050406030204" pitchFamily="18" charset="0"/>
-                      </a:rPr>
-                      <m:t>=</m:t>
-                    </m:r>
-                    <m:r>
-                      <a:rPr>
-                        <a:latin typeface="Cambria Math" panose="02040503050406030204" pitchFamily="18" charset="0"/>
-                      </a:rPr>
-                      <m:t>0</m:t>
-                    </m:r>
-                    <m:r>
-                      <a:rPr>
-                        <a:latin typeface="Cambria Math" panose="02040503050406030204" pitchFamily="18" charset="0"/>
-                      </a:rPr>
-                      <m:t>.</m:t>
-                    </m:r>
-                    <m:r>
-                      <a:rPr>
-                        <a:latin typeface="Cambria Math" panose="02040503050406030204" pitchFamily="18" charset="0"/>
-                      </a:rPr>
-                      <m:t>5</m:t>
-                    </m:r>
-                    <m:r>
-                      <a:rPr>
-                        <a:latin typeface="Cambria Math" panose="02040503050406030204" pitchFamily="18" charset="0"/>
-                      </a:rPr>
-                      <m:t>→</m:t>
-                    </m:r>
-                  </m:oMath>
+                  <m:oMathPara xmlns:m="http://schemas.openxmlformats.org/officeDocument/2006/math">
+                    <m:oMathParaPr>
+                      <m:jc m:val="centerGroup"/>
+                    </m:oMathParaPr>
+                    <m:oMath xmlns:m="http://schemas.openxmlformats.org/officeDocument/2006/math">
+                      <m:r>
+                        <a:rPr lang="en-US" sz="2300" i="1">
+                          <a:latin typeface="Cambria Math" panose="02040503050406030204" pitchFamily="18" charset="0"/>
+                        </a:rPr>
+                        <m:t>𝑃</m:t>
+                      </m:r>
+                      <m:d>
+                        <m:dPr>
+                          <m:ctrlPr>
+                            <a:rPr lang="ar-AE" sz="2300" i="1">
+                              <a:latin typeface="Cambria Math" panose="02040503050406030204" pitchFamily="18" charset="0"/>
+                            </a:rPr>
+                          </m:ctrlPr>
+                        </m:dPr>
+                        <m:e>
+                          <m:r>
+                            <a:rPr lang="ar-AE" sz="2300">
+                              <a:latin typeface="Cambria Math" panose="02040503050406030204" pitchFamily="18" charset="0"/>
+                            </a:rPr>
+                            <m:t>𝜃</m:t>
+                          </m:r>
+                          <m:r>
+                            <a:rPr lang="ar-AE" sz="2300">
+                              <a:latin typeface="Cambria Math" panose="02040503050406030204" pitchFamily="18" charset="0"/>
+                            </a:rPr>
+                            <m:t>=</m:t>
+                          </m:r>
+                          <m:r>
+                            <a:rPr lang="en-US" sz="2300" i="1">
+                              <a:latin typeface="Cambria Math" panose="02040503050406030204" pitchFamily="18" charset="0"/>
+                            </a:rPr>
+                            <m:t>1</m:t>
+                          </m:r>
+                        </m:e>
+                      </m:d>
+                      <m:r>
+                        <a:rPr lang="en-US" sz="2300" b="0" i="1" smtClean="0">
+                          <a:latin typeface="Cambria Math" panose="02040503050406030204" pitchFamily="18" charset="0"/>
+                        </a:rPr>
+                        <m:t>=</m:t>
+                      </m:r>
+                      <m:r>
+                        <a:rPr lang="en-US" sz="2300" i="1">
+                          <a:latin typeface="Cambria Math" panose="02040503050406030204" pitchFamily="18" charset="0"/>
+                        </a:rPr>
+                        <m:t>𝑃</m:t>
+                      </m:r>
+                      <m:d>
+                        <m:dPr>
+                          <m:ctrlPr>
+                            <a:rPr lang="ar-AE" sz="2300" i="1">
+                              <a:latin typeface="Cambria Math" panose="02040503050406030204" pitchFamily="18" charset="0"/>
+                            </a:rPr>
+                          </m:ctrlPr>
+                        </m:dPr>
+                        <m:e>
+                          <m:r>
+                            <a:rPr lang="ar-AE" sz="2300">
+                              <a:latin typeface="Cambria Math" panose="02040503050406030204" pitchFamily="18" charset="0"/>
+                            </a:rPr>
+                            <m:t>𝜃</m:t>
+                          </m:r>
+                          <m:r>
+                            <a:rPr lang="ar-AE" sz="2300">
+                              <a:latin typeface="Cambria Math" panose="02040503050406030204" pitchFamily="18" charset="0"/>
+                            </a:rPr>
+                            <m:t>=</m:t>
+                          </m:r>
+                          <m:r>
+                            <a:rPr lang="en-US" sz="2300" b="0" i="1" smtClean="0">
+                              <a:latin typeface="Cambria Math" panose="02040503050406030204" pitchFamily="18" charset="0"/>
+                            </a:rPr>
+                            <m:t>1</m:t>
+                          </m:r>
+                          <m:r>
+                            <a:rPr lang="en-US" sz="2300" b="0" i="1" smtClean="0">
+                              <a:latin typeface="Cambria Math" panose="02040503050406030204" pitchFamily="18" charset="0"/>
+                            </a:rPr>
+                            <m:t>|</m:t>
+                          </m:r>
+                          <m:r>
+                            <a:rPr lang="en-US" sz="2300" b="0" i="1" smtClean="0">
+                              <a:latin typeface="Cambria Math" panose="02040503050406030204" pitchFamily="18" charset="0"/>
+                            </a:rPr>
+                            <m:t>𝑓𝑎𝑡</m:t>
+                          </m:r>
+                          <m:r>
+                            <a:rPr lang="en-US" sz="2300" b="0" i="1" smtClean="0">
+                              <a:latin typeface="Cambria Math" panose="02040503050406030204" pitchFamily="18" charset="0"/>
+                            </a:rPr>
+                            <m:t>h</m:t>
+                          </m:r>
+                          <m:r>
+                            <a:rPr lang="en-US" sz="2300" b="0" i="1" smtClean="0">
+                              <a:latin typeface="Cambria Math" panose="02040503050406030204" pitchFamily="18" charset="0"/>
+                            </a:rPr>
+                            <m:t>𝑒𝑟</m:t>
+                          </m:r>
+                        </m:e>
+                      </m:d>
+                      <m:r>
+                        <a:rPr lang="en-US" sz="2300" b="0" i="1" smtClean="0">
+                          <a:latin typeface="Cambria Math" panose="02040503050406030204" pitchFamily="18" charset="0"/>
+                          <a:ea typeface="Cambria Math" panose="02040503050406030204" pitchFamily="18" charset="0"/>
+                        </a:rPr>
+                        <m:t>+</m:t>
+                      </m:r>
+                      <m:r>
+                        <a:rPr lang="en-US" sz="2300" i="1">
+                          <a:latin typeface="Cambria Math" panose="02040503050406030204" pitchFamily="18" charset="0"/>
+                        </a:rPr>
+                        <m:t>𝑃</m:t>
+                      </m:r>
+                      <m:d>
+                        <m:dPr>
+                          <m:ctrlPr>
+                            <a:rPr lang="ar-AE" sz="2300" i="1">
+                              <a:latin typeface="Cambria Math" panose="02040503050406030204" pitchFamily="18" charset="0"/>
+                            </a:rPr>
+                          </m:ctrlPr>
+                        </m:dPr>
+                        <m:e>
+                          <m:r>
+                            <a:rPr lang="ar-AE" sz="2300">
+                              <a:latin typeface="Cambria Math" panose="02040503050406030204" pitchFamily="18" charset="0"/>
+                            </a:rPr>
+                            <m:t>𝜃</m:t>
+                          </m:r>
+                          <m:r>
+                            <a:rPr lang="ar-AE" sz="2300">
+                              <a:latin typeface="Cambria Math" panose="02040503050406030204" pitchFamily="18" charset="0"/>
+                            </a:rPr>
+                            <m:t>=</m:t>
+                          </m:r>
+                          <m:r>
+                            <a:rPr lang="en-US" sz="2300" b="0" i="1" smtClean="0">
+                              <a:latin typeface="Cambria Math" panose="02040503050406030204" pitchFamily="18" charset="0"/>
+                            </a:rPr>
+                            <m:t>1</m:t>
+                          </m:r>
+                          <m:r>
+                            <a:rPr lang="en-US" sz="2300" b="0" i="1" smtClean="0">
+                              <a:latin typeface="Cambria Math" panose="02040503050406030204" pitchFamily="18" charset="0"/>
+                            </a:rPr>
+                            <m:t>|</m:t>
+                          </m:r>
+                          <m:r>
+                            <a:rPr lang="en-US" sz="2300" b="0" i="1" smtClean="0">
+                              <a:latin typeface="Cambria Math" panose="02040503050406030204" pitchFamily="18" charset="0"/>
+                            </a:rPr>
+                            <m:t>𝑚𝑜𝑡</m:t>
+                          </m:r>
+                          <m:r>
+                            <a:rPr lang="en-US" sz="2300" b="0" i="1" smtClean="0">
+                              <a:latin typeface="Cambria Math" panose="02040503050406030204" pitchFamily="18" charset="0"/>
+                            </a:rPr>
+                            <m:t>h</m:t>
+                          </m:r>
+                          <m:r>
+                            <a:rPr lang="en-US" sz="2300" b="0" i="1" smtClean="0">
+                              <a:latin typeface="Cambria Math" panose="02040503050406030204" pitchFamily="18" charset="0"/>
+                            </a:rPr>
+                            <m:t>𝑒𝑟</m:t>
+                          </m:r>
+                        </m:e>
+                      </m:d>
+                    </m:oMath>
+                  </m:oMathPara>
                 </a14:m>
-                <a:r>
-                  <a:rPr dirty="0"/>
-                  <a:t> Woman’s X chromosome has P = 0.5 that it is from mother, who carried the marker with </a:t>
-                </a:r>
+                <a:endParaRPr lang="en-US" sz="2300" b="0" i="0" dirty="0">
+                  <a:latin typeface="Cambria Math" panose="02040503050406030204" pitchFamily="18" charset="0"/>
+                </a:endParaRPr>
+              </a:p>
+              <a:p>
+                <a:pPr marL="342900" lvl="1" indent="0">
+                  <a:buNone/>
+                </a:pPr>
                 <a14:m>
-                  <m:oMath xmlns:m="http://schemas.openxmlformats.org/officeDocument/2006/math">
-                    <m:r>
-                      <a:rPr>
-                        <a:latin typeface="Cambria Math" panose="02040503050406030204" pitchFamily="18" charset="0"/>
-                      </a:rPr>
-                      <m:t>𝑃</m:t>
-                    </m:r>
-                    <m:r>
-                      <a:rPr>
-                        <a:latin typeface="Cambria Math" panose="02040503050406030204" pitchFamily="18" charset="0"/>
-                      </a:rPr>
-                      <m:t>=</m:t>
-                    </m:r>
-                    <m:r>
-                      <a:rPr>
-                        <a:latin typeface="Cambria Math" panose="02040503050406030204" pitchFamily="18" charset="0"/>
-                      </a:rPr>
-                      <m:t>1</m:t>
-                    </m:r>
-                    <m:r>
-                      <a:rPr>
-                        <a:latin typeface="Cambria Math" panose="02040503050406030204" pitchFamily="18" charset="0"/>
-                      </a:rPr>
-                      <m:t>.</m:t>
-                    </m:r>
-                    <m:r>
-                      <a:rPr>
-                        <a:latin typeface="Cambria Math" panose="02040503050406030204" pitchFamily="18" charset="0"/>
-                      </a:rPr>
-                      <m:t>0</m:t>
-                    </m:r>
-                  </m:oMath>
+                  <m:oMathPara xmlns:m="http://schemas.openxmlformats.org/officeDocument/2006/math">
+                    <m:oMathParaPr>
+                      <m:jc m:val="centerGroup"/>
+                    </m:oMathParaPr>
+                    <m:oMath xmlns:m="http://schemas.openxmlformats.org/officeDocument/2006/math">
+                      <m:r>
+                        <a:rPr lang="en-US" sz="2300" b="0" i="0" smtClean="0">
+                          <a:latin typeface="Cambria Math" panose="02040503050406030204" pitchFamily="18" charset="0"/>
+                        </a:rPr>
+                        <m:t>=</m:t>
+                      </m:r>
+                      <m:r>
+                        <a:rPr lang="en-US" sz="2300" b="0" i="0" smtClean="0">
+                          <a:latin typeface="Cambria Math" panose="02040503050406030204" pitchFamily="18" charset="0"/>
+                        </a:rPr>
+                        <m:t>0</m:t>
+                      </m:r>
+                      <m:r>
+                        <a:rPr lang="en-US" sz="2300" b="0" i="0" smtClean="0">
+                          <a:latin typeface="Cambria Math" panose="02040503050406030204" pitchFamily="18" charset="0"/>
+                          <a:ea typeface="Cambria Math" panose="02040503050406030204" pitchFamily="18" charset="0"/>
+                        </a:rPr>
+                        <m:t>+</m:t>
+                      </m:r>
+                      <m:r>
+                        <a:rPr lang="en-US" sz="2300" i="1">
+                          <a:latin typeface="Cambria Math" panose="02040503050406030204" pitchFamily="18" charset="0"/>
+                          <a:ea typeface="Cambria Math" panose="02040503050406030204" pitchFamily="18" charset="0"/>
+                        </a:rPr>
+                        <m:t>0</m:t>
+                      </m:r>
+                      <m:r>
+                        <a:rPr lang="en-US" sz="2300" i="1">
+                          <a:latin typeface="Cambria Math" panose="02040503050406030204" pitchFamily="18" charset="0"/>
+                          <a:ea typeface="Cambria Math" panose="02040503050406030204" pitchFamily="18" charset="0"/>
+                        </a:rPr>
+                        <m:t>.</m:t>
+                      </m:r>
+                      <m:r>
+                        <a:rPr lang="en-US" sz="2300" i="1">
+                          <a:latin typeface="Cambria Math" panose="02040503050406030204" pitchFamily="18" charset="0"/>
+                          <a:ea typeface="Cambria Math" panose="02040503050406030204" pitchFamily="18" charset="0"/>
+                        </a:rPr>
+                        <m:t>5</m:t>
+                      </m:r>
+                      <m:r>
+                        <a:rPr lang="ar-AE" sz="2300">
+                          <a:latin typeface="Cambria Math" panose="02040503050406030204" pitchFamily="18" charset="0"/>
+                        </a:rPr>
+                        <m:t>=</m:t>
+                      </m:r>
+                      <m:r>
+                        <a:rPr lang="ar-AE" sz="2300">
+                          <a:latin typeface="Cambria Math" panose="02040503050406030204" pitchFamily="18" charset="0"/>
+                        </a:rPr>
+                        <m:t>0</m:t>
+                      </m:r>
+                      <m:r>
+                        <a:rPr lang="ar-AE" sz="2300">
+                          <a:latin typeface="Cambria Math" panose="02040503050406030204" pitchFamily="18" charset="0"/>
+                        </a:rPr>
+                        <m:t>.</m:t>
+                      </m:r>
+                      <m:r>
+                        <a:rPr lang="en-US" sz="2300" b="0" i="0" smtClean="0">
+                          <a:latin typeface="Cambria Math" panose="02040503050406030204" pitchFamily="18" charset="0"/>
+                        </a:rPr>
+                        <m:t>5</m:t>
+                      </m:r>
+                    </m:oMath>
+                  </m:oMathPara>
                 </a14:m>
-                <a:endParaRPr dirty="0"/>
+                <a:endParaRPr sz="2300" dirty="0"/>
               </a:p>
             </p:txBody>
           </p:sp>
         </mc:Choice>
-        <mc:Fallback xmlns="">
+        <mc:Fallback>
           <p:sp>
             <p:nvSpPr>
               <p:cNvPr id="3" name="Content Placeholder 2"/>
@@ -6613,13 +7234,13 @@
             </p:nvSpPr>
             <p:spPr>
               <a:xfrm>
-                <a:off x="457200" y="1200151"/>
-                <a:ext cx="8229600" cy="3622634"/>
+                <a:off x="510032" y="1018525"/>
+                <a:ext cx="8229600" cy="4041155"/>
               </a:xfrm>
               <a:blipFill>
                 <a:blip r:embed="rId2"/>
                 <a:stretch>
-                  <a:fillRect l="-667" t="-2189"/>
+                  <a:fillRect l="-519" t="-1508"/>
                 </a:stretch>
               </a:blipFill>
             </p:spPr>
@@ -6687,8 +7308,8 @@
           </a:p>
         </p:txBody>
       </p:sp>
-      <mc:AlternateContent xmlns:mc="http://schemas.openxmlformats.org/markup-compatibility/2006" xmlns:a14="http://schemas.microsoft.com/office/drawing/2010/main">
-        <mc:Choice Requires="a14">
+      <mc:AlternateContent xmlns:mc="http://schemas.openxmlformats.org/markup-compatibility/2006">
+        <mc:Choice xmlns:a14="http://schemas.microsoft.com/office/drawing/2010/main" Requires="a14">
           <p:sp>
             <p:nvSpPr>
               <p:cNvPr id="3" name="Content Placeholder 2"/>
@@ -6699,10 +7320,15 @@
                 <p:ph idx="1"/>
               </p:nvPr>
             </p:nvSpPr>
-            <p:spPr/>
+            <p:spPr>
+              <a:xfrm>
+                <a:off x="457200" y="1200151"/>
+                <a:ext cx="8229600" cy="3737370"/>
+              </a:xfrm>
+            </p:spPr>
             <p:txBody>
               <a:bodyPr>
-                <a:normAutofit fontScale="85000" lnSpcReduction="20000"/>
+                <a:normAutofit fontScale="85000" lnSpcReduction="10000"/>
               </a:bodyPr>
               <a:lstStyle/>
               <a:p>
@@ -6816,7 +7442,11 @@
                 <a:pPr lvl="0"/>
                 <a:r>
                   <a:rPr lang="en-US" dirty="0"/>
-                  <a:t>Two possible cases</a:t>
+                  <a:t>Two possible hypotheses with </a:t>
+                </a:r>
+                <a:r>
+                  <a:rPr lang="en-US" b="1" dirty="0"/>
+                  <a:t>likelihood</a:t>
                 </a:r>
               </a:p>
               <a:p>
@@ -6851,10 +7481,9 @@
                     </m:r>
                   </m:oMath>
                 </a14:m>
-                <a:r>
-                  <a:rPr lang="en-US" dirty="0"/>
-                  <a:t>, and probability of passing to son = 0.5</a:t>
-                </a:r>
+                <a:endParaRPr lang="en-US" dirty="0">
+                  <a:latin typeface="Cambria Math" panose="02040503050406030204" pitchFamily="18" charset="0"/>
+                </a:endParaRPr>
               </a:p>
               <a:p>
                 <a:pPr marL="342900" lvl="1" indent="0">
@@ -7243,7 +7872,7 @@
                     </m:oMathParaPr>
                     <m:oMath xmlns:m="http://schemas.openxmlformats.org/officeDocument/2006/math">
                       <m:r>
-                        <a:rPr lang="en-US" b="0" i="1" smtClean="0">
+                        <a:rPr lang="en-US" sz="2100" b="0" i="1" smtClean="0">
                           <a:latin typeface="Cambria Math" panose="02040503050406030204" pitchFamily="18" charset="0"/>
                         </a:rPr>
                         <m:t>𝑃</m:t>
@@ -7251,7 +7880,7 @@
                       <m:d>
                         <m:dPr>
                           <m:ctrlPr>
-                            <a:rPr lang="en-US" b="0" i="1" smtClean="0">
+                            <a:rPr lang="en-US" sz="2100" b="0" i="1" smtClean="0">
                               <a:latin typeface="Cambria Math" panose="02040503050406030204" pitchFamily="18" charset="0"/>
                             </a:rPr>
                           </m:ctrlPr>
@@ -7260,14 +7889,14 @@
                           <m:sSub>
                             <m:sSubPr>
                               <m:ctrlPr>
-                                <a:rPr lang="en-US" b="0" i="1" smtClean="0">
+                                <a:rPr lang="en-US" sz="2100" b="0" i="1" smtClean="0">
                                   <a:latin typeface="Cambria Math" panose="02040503050406030204" pitchFamily="18" charset="0"/>
                                 </a:rPr>
                               </m:ctrlPr>
                             </m:sSubPr>
                             <m:e>
                               <m:r>
-                                <a:rPr lang="en-US" b="0" i="1" smtClean="0">
+                                <a:rPr lang="en-US" sz="2100" b="0" i="1" smtClean="0">
                                   <a:latin typeface="Cambria Math" panose="02040503050406030204" pitchFamily="18" charset="0"/>
                                 </a:rPr>
                                 <m:t>𝑥</m:t>
@@ -7275,7 +7904,7 @@
                             </m:e>
                             <m:sub>
                               <m:r>
-                                <a:rPr lang="en-US" b="0" i="1" smtClean="0">
+                                <a:rPr lang="en-US" sz="2100" b="0" i="1" smtClean="0">
                                   <a:latin typeface="Cambria Math" panose="02040503050406030204" pitchFamily="18" charset="0"/>
                                 </a:rPr>
                                 <m:t>1</m:t>
@@ -7283,19 +7912,19 @@
                             </m:sub>
                           </m:sSub>
                           <m:r>
-                            <a:rPr lang="en-US" b="0" i="1" smtClean="0">
+                            <a:rPr lang="en-US" sz="2100" b="0" i="1" smtClean="0">
                               <a:latin typeface="Cambria Math" panose="02040503050406030204" pitchFamily="18" charset="0"/>
                             </a:rPr>
                             <m:t>=</m:t>
                           </m:r>
                           <m:r>
-                            <a:rPr lang="en-US" b="0" i="1" smtClean="0">
+                            <a:rPr lang="en-US" sz="2100" b="0" i="1" smtClean="0">
                               <a:latin typeface="Cambria Math" panose="02040503050406030204" pitchFamily="18" charset="0"/>
                             </a:rPr>
                             <m:t>0</m:t>
                           </m:r>
                           <m:r>
-                            <a:rPr lang="en-US" b="0" i="1" smtClean="0">
+                            <a:rPr lang="en-US" sz="2100" b="0" i="1" smtClean="0">
                               <a:latin typeface="Cambria Math" panose="02040503050406030204" pitchFamily="18" charset="0"/>
                             </a:rPr>
                             <m:t>,</m:t>
@@ -7303,14 +7932,14 @@
                           <m:sSub>
                             <m:sSubPr>
                               <m:ctrlPr>
-                                <a:rPr lang="en-US" b="0" i="1" smtClean="0">
+                                <a:rPr lang="en-US" sz="2100" b="0" i="1" smtClean="0">
                                   <a:latin typeface="Cambria Math" panose="02040503050406030204" pitchFamily="18" charset="0"/>
                                 </a:rPr>
                               </m:ctrlPr>
                             </m:sSubPr>
                             <m:e>
                               <m:r>
-                                <a:rPr lang="en-US" b="0" i="1" smtClean="0">
+                                <a:rPr lang="en-US" sz="2100" b="0" i="1" smtClean="0">
                                   <a:latin typeface="Cambria Math" panose="02040503050406030204" pitchFamily="18" charset="0"/>
                                 </a:rPr>
                                 <m:t>𝑥</m:t>
@@ -7318,7 +7947,7 @@
                             </m:e>
                             <m:sub>
                               <m:r>
-                                <a:rPr lang="en-US" b="0" i="1" smtClean="0">
+                                <a:rPr lang="en-US" sz="2100" b="0" i="1" smtClean="0">
                                   <a:latin typeface="Cambria Math" panose="02040503050406030204" pitchFamily="18" charset="0"/>
                                 </a:rPr>
                                 <m:t>2</m:t>
@@ -7326,53 +7955,53 @@
                             </m:sub>
                           </m:sSub>
                           <m:r>
-                            <a:rPr lang="en-US" b="0" i="1" smtClean="0">
+                            <a:rPr lang="en-US" sz="2100" b="0" i="1" smtClean="0">
                               <a:latin typeface="Cambria Math" panose="02040503050406030204" pitchFamily="18" charset="0"/>
                             </a:rPr>
                             <m:t>=</m:t>
                           </m:r>
                           <m:r>
-                            <a:rPr lang="en-US" b="0" i="1" smtClean="0">
+                            <a:rPr lang="en-US" sz="2100" b="0" i="1" smtClean="0">
                               <a:latin typeface="Cambria Math" panose="02040503050406030204" pitchFamily="18" charset="0"/>
                             </a:rPr>
                             <m:t>0</m:t>
                           </m:r>
                           <m:r>
-                            <a:rPr lang="en-US" b="0" i="1" smtClean="0">
+                            <a:rPr lang="en-US" sz="2100" b="0" i="1" smtClean="0">
                               <a:latin typeface="Cambria Math" panose="02040503050406030204" pitchFamily="18" charset="0"/>
                             </a:rPr>
                             <m:t>| </m:t>
                           </m:r>
                           <m:r>
-                            <a:rPr lang="en-US" b="0" i="1" smtClean="0">
+                            <a:rPr lang="en-US" sz="2100" b="0" i="1" smtClean="0">
                               <a:latin typeface="Cambria Math" panose="02040503050406030204" pitchFamily="18" charset="0"/>
                               <a:ea typeface="Cambria Math" panose="02040503050406030204" pitchFamily="18" charset="0"/>
                             </a:rPr>
                             <m:t>𝜃</m:t>
                           </m:r>
                           <m:r>
-                            <a:rPr lang="en-US" b="0" i="1" smtClean="0">
+                            <a:rPr lang="en-US" sz="2100" b="0" i="1" smtClean="0">
                               <a:latin typeface="Cambria Math" panose="02040503050406030204" pitchFamily="18" charset="0"/>
                               <a:ea typeface="Cambria Math" panose="02040503050406030204" pitchFamily="18" charset="0"/>
                             </a:rPr>
                             <m:t>=</m:t>
                           </m:r>
                           <m:r>
-                            <a:rPr lang="en-US" b="0" i="1" smtClean="0">
+                            <a:rPr lang="en-US" sz="2100" b="0" i="1" smtClean="0">
                               <a:latin typeface="Cambria Math" panose="02040503050406030204" pitchFamily="18" charset="0"/>
                               <a:ea typeface="Cambria Math" panose="02040503050406030204" pitchFamily="18" charset="0"/>
                             </a:rPr>
                             <m:t>0</m:t>
                           </m:r>
                           <m:r>
-                            <a:rPr lang="en-US" b="0" i="1" smtClean="0">
+                            <a:rPr lang="en-US" sz="2100" b="0" i="1" smtClean="0">
                               <a:latin typeface="Cambria Math" panose="02040503050406030204" pitchFamily="18" charset="0"/>
                               <a:ea typeface="Cambria Math" panose="02040503050406030204" pitchFamily="18" charset="0"/>
                             </a:rPr>
                             <m:t>.</m:t>
                           </m:r>
                           <m:r>
-                            <a:rPr lang="en-US" b="0" i="1" smtClean="0">
+                            <a:rPr lang="en-US" sz="2100" b="0" i="1" smtClean="0">
                               <a:latin typeface="Cambria Math" panose="02040503050406030204" pitchFamily="18" charset="0"/>
                               <a:ea typeface="Cambria Math" panose="02040503050406030204" pitchFamily="18" charset="0"/>
                             </a:rPr>
@@ -7381,196 +8010,196 @@
                         </m:e>
                       </m:d>
                       <m:r>
-                        <a:rPr lang="en-US" b="0" i="1" smtClean="0">
+                        <a:rPr lang="en-US" sz="2100" b="0" i="1" smtClean="0">
                           <a:latin typeface="Cambria Math" panose="02040503050406030204" pitchFamily="18" charset="0"/>
                         </a:rPr>
                         <m:t>=</m:t>
                       </m:r>
                       <m:r>
-                        <a:rPr lang="en-US" i="1">
+                        <a:rPr lang="en-US" sz="2100" i="1">
                           <a:latin typeface="Cambria Math" panose="02040503050406030204" pitchFamily="18" charset="0"/>
                         </a:rPr>
                         <m:t>(</m:t>
                       </m:r>
                       <m:r>
-                        <a:rPr lang="en-US" i="1">
+                        <a:rPr lang="en-US" sz="2100" i="1">
                           <a:latin typeface="Cambria Math" panose="02040503050406030204" pitchFamily="18" charset="0"/>
                         </a:rPr>
                         <m:t>1</m:t>
                       </m:r>
                       <m:r>
-                        <a:rPr lang="en-US" i="1">
+                        <a:rPr lang="en-US" sz="2100" i="1">
                           <a:latin typeface="Cambria Math" panose="02040503050406030204" pitchFamily="18" charset="0"/>
                         </a:rPr>
                         <m:t>.</m:t>
                       </m:r>
                       <m:r>
-                        <a:rPr lang="en-US" i="1">
+                        <a:rPr lang="en-US" sz="2100" i="1">
                           <a:latin typeface="Cambria Math" panose="02040503050406030204" pitchFamily="18" charset="0"/>
                         </a:rPr>
                         <m:t>0</m:t>
                       </m:r>
                       <m:r>
-                        <a:rPr lang="en-US" i="1">
+                        <a:rPr lang="en-US" sz="2100" i="1">
                           <a:latin typeface="Cambria Math" panose="02040503050406030204" pitchFamily="18" charset="0"/>
                         </a:rPr>
                         <m:t>−</m:t>
                       </m:r>
                       <m:r>
-                        <a:rPr lang="en-US" i="1">
+                        <a:rPr lang="en-US" sz="2100" i="1">
                           <a:latin typeface="Cambria Math" panose="02040503050406030204" pitchFamily="18" charset="0"/>
                         </a:rPr>
                         <m:t>0</m:t>
                       </m:r>
                       <m:r>
-                        <a:rPr lang="en-US" i="1">
+                        <a:rPr lang="en-US" sz="2100" i="1">
                           <a:latin typeface="Cambria Math" panose="02040503050406030204" pitchFamily="18" charset="0"/>
                         </a:rPr>
                         <m:t>.</m:t>
                       </m:r>
                       <m:r>
-                        <a:rPr lang="en-US" b="0" i="1" smtClean="0">
+                        <a:rPr lang="en-US" sz="2100" b="0" i="1" smtClean="0">
                           <a:latin typeface="Cambria Math" panose="02040503050406030204" pitchFamily="18" charset="0"/>
                         </a:rPr>
                         <m:t>0</m:t>
                       </m:r>
                       <m:r>
-                        <a:rPr lang="en-US" i="1">
+                        <a:rPr lang="en-US" sz="2100" i="1">
                           <a:latin typeface="Cambria Math" panose="02040503050406030204" pitchFamily="18" charset="0"/>
                         </a:rPr>
                         <m:t>) ×(</m:t>
                       </m:r>
                       <m:r>
-                        <a:rPr lang="en-US" i="1">
+                        <a:rPr lang="en-US" sz="2100" i="1">
                           <a:latin typeface="Cambria Math" panose="02040503050406030204" pitchFamily="18" charset="0"/>
                           <a:ea typeface="Cambria Math" panose="02040503050406030204" pitchFamily="18" charset="0"/>
                         </a:rPr>
                         <m:t>1</m:t>
                       </m:r>
                       <m:r>
-                        <a:rPr lang="en-US" i="1">
+                        <a:rPr lang="en-US" sz="2100" i="1">
                           <a:latin typeface="Cambria Math" panose="02040503050406030204" pitchFamily="18" charset="0"/>
                           <a:ea typeface="Cambria Math" panose="02040503050406030204" pitchFamily="18" charset="0"/>
                         </a:rPr>
                         <m:t>.</m:t>
                       </m:r>
                       <m:r>
-                        <a:rPr lang="en-US" i="1">
+                        <a:rPr lang="en-US" sz="2100" i="1">
                           <a:latin typeface="Cambria Math" panose="02040503050406030204" pitchFamily="18" charset="0"/>
                           <a:ea typeface="Cambria Math" panose="02040503050406030204" pitchFamily="18" charset="0"/>
                         </a:rPr>
                         <m:t>0</m:t>
                       </m:r>
                       <m:r>
-                        <a:rPr lang="en-US" i="1">
+                        <a:rPr lang="en-US" sz="2100" i="1">
                           <a:latin typeface="Cambria Math" panose="02040503050406030204" pitchFamily="18" charset="0"/>
                           <a:ea typeface="Cambria Math" panose="02040503050406030204" pitchFamily="18" charset="0"/>
                         </a:rPr>
                         <m:t>−</m:t>
                       </m:r>
                       <m:r>
-                        <a:rPr lang="en-US" i="1">
+                        <a:rPr lang="en-US" sz="2100" i="1">
                           <a:latin typeface="Cambria Math" panose="02040503050406030204" pitchFamily="18" charset="0"/>
                           <a:ea typeface="Cambria Math" panose="02040503050406030204" pitchFamily="18" charset="0"/>
                         </a:rPr>
                         <m:t>0</m:t>
                       </m:r>
                       <m:r>
-                        <a:rPr lang="en-US" i="1">
+                        <a:rPr lang="en-US" sz="2100" i="1">
                           <a:latin typeface="Cambria Math" panose="02040503050406030204" pitchFamily="18" charset="0"/>
                           <a:ea typeface="Cambria Math" panose="02040503050406030204" pitchFamily="18" charset="0"/>
                         </a:rPr>
                         <m:t>.</m:t>
                       </m:r>
                       <m:r>
-                        <a:rPr lang="en-US" b="0" i="1" smtClean="0">
+                        <a:rPr lang="en-US" sz="2100" b="0" i="1" smtClean="0">
                           <a:latin typeface="Cambria Math" panose="02040503050406030204" pitchFamily="18" charset="0"/>
                           <a:ea typeface="Cambria Math" panose="02040503050406030204" pitchFamily="18" charset="0"/>
                         </a:rPr>
                         <m:t>0</m:t>
                       </m:r>
                       <m:r>
-                        <a:rPr lang="en-US" i="1">
+                        <a:rPr lang="en-US" sz="2100" i="1">
                           <a:latin typeface="Cambria Math" panose="02040503050406030204" pitchFamily="18" charset="0"/>
                           <a:ea typeface="Cambria Math" panose="02040503050406030204" pitchFamily="18" charset="0"/>
                         </a:rPr>
                         <m:t>)</m:t>
                       </m:r>
                       <m:r>
-                        <a:rPr lang="en-US" i="1">
+                        <a:rPr lang="en-US" sz="2100" i="1">
                           <a:latin typeface="Cambria Math" panose="02040503050406030204" pitchFamily="18" charset="0"/>
                         </a:rPr>
                         <m:t>=</m:t>
                       </m:r>
                       <m:r>
-                        <a:rPr lang="en-US" b="0" i="1" smtClean="0">
+                        <a:rPr lang="en-US" sz="2100" b="0" i="1" smtClean="0">
                           <a:latin typeface="Cambria Math" panose="02040503050406030204" pitchFamily="18" charset="0"/>
                         </a:rPr>
                         <m:t>1</m:t>
                       </m:r>
                       <m:r>
-                        <a:rPr lang="en-US" b="0" i="1" smtClean="0">
+                        <a:rPr lang="en-US" sz="2100" b="0" i="1" smtClean="0">
                           <a:latin typeface="Cambria Math" panose="02040503050406030204" pitchFamily="18" charset="0"/>
                         </a:rPr>
                         <m:t>.</m:t>
                       </m:r>
                       <m:r>
-                        <a:rPr lang="en-US" b="0" i="1" smtClean="0">
+                        <a:rPr lang="en-US" sz="2100" b="0" i="1" smtClean="0">
                           <a:latin typeface="Cambria Math" panose="02040503050406030204" pitchFamily="18" charset="0"/>
                         </a:rPr>
                         <m:t>0</m:t>
                       </m:r>
                       <m:r>
-                        <a:rPr lang="en-US" i="1">
+                        <a:rPr lang="en-US" sz="2100" i="1">
                           <a:latin typeface="Cambria Math" panose="02040503050406030204" pitchFamily="18" charset="0"/>
                           <a:ea typeface="Cambria Math" panose="02040503050406030204" pitchFamily="18" charset="0"/>
                         </a:rPr>
                         <m:t>×</m:t>
                       </m:r>
                       <m:r>
-                        <a:rPr lang="en-US" b="0" i="1" smtClean="0">
+                        <a:rPr lang="en-US" sz="2100" b="0" i="1" smtClean="0">
                           <a:latin typeface="Cambria Math" panose="02040503050406030204" pitchFamily="18" charset="0"/>
                           <a:ea typeface="Cambria Math" panose="02040503050406030204" pitchFamily="18" charset="0"/>
                         </a:rPr>
                         <m:t>1</m:t>
                       </m:r>
                       <m:r>
-                        <a:rPr lang="en-US" b="0" i="1" smtClean="0">
+                        <a:rPr lang="en-US" sz="2100" b="0" i="1" smtClean="0">
                           <a:latin typeface="Cambria Math" panose="02040503050406030204" pitchFamily="18" charset="0"/>
                           <a:ea typeface="Cambria Math" panose="02040503050406030204" pitchFamily="18" charset="0"/>
                         </a:rPr>
                         <m:t>.</m:t>
                       </m:r>
                       <m:r>
-                        <a:rPr lang="en-US" b="0" i="1" smtClean="0">
+                        <a:rPr lang="en-US" sz="2100" b="0" i="1" smtClean="0">
                           <a:latin typeface="Cambria Math" panose="02040503050406030204" pitchFamily="18" charset="0"/>
                           <a:ea typeface="Cambria Math" panose="02040503050406030204" pitchFamily="18" charset="0"/>
                         </a:rPr>
                         <m:t>0</m:t>
                       </m:r>
                       <m:r>
-                        <a:rPr lang="en-US" i="1">
+                        <a:rPr lang="en-US" sz="2100" i="1">
                           <a:latin typeface="Cambria Math" panose="02040503050406030204" pitchFamily="18" charset="0"/>
                           <a:ea typeface="Cambria Math" panose="02040503050406030204" pitchFamily="18" charset="0"/>
                         </a:rPr>
                         <m:t>=</m:t>
                       </m:r>
                       <m:r>
-                        <a:rPr lang="en-US" b="0" i="1" smtClean="0">
+                        <a:rPr lang="en-US" sz="2100" b="0" i="1" smtClean="0">
                           <a:latin typeface="Cambria Math" panose="02040503050406030204" pitchFamily="18" charset="0"/>
                           <a:ea typeface="Cambria Math" panose="02040503050406030204" pitchFamily="18" charset="0"/>
                         </a:rPr>
                         <m:t>1</m:t>
                       </m:r>
                       <m:r>
-                        <a:rPr lang="en-US" b="0" i="1" smtClean="0">
+                        <a:rPr lang="en-US" sz="2100" b="0" i="1" smtClean="0">
                           <a:latin typeface="Cambria Math" panose="02040503050406030204" pitchFamily="18" charset="0"/>
                           <a:ea typeface="Cambria Math" panose="02040503050406030204" pitchFamily="18" charset="0"/>
                         </a:rPr>
                         <m:t>.</m:t>
                       </m:r>
                       <m:r>
-                        <a:rPr lang="en-US" b="0" i="1" smtClean="0">
+                        <a:rPr lang="en-US" sz="2100" b="0" i="1" smtClean="0">
                           <a:latin typeface="Cambria Math" panose="02040503050406030204" pitchFamily="18" charset="0"/>
                           <a:ea typeface="Cambria Math" panose="02040503050406030204" pitchFamily="18" charset="0"/>
                         </a:rPr>
@@ -7579,7 +8208,7 @@
                     </m:oMath>
                   </m:oMathPara>
                 </a14:m>
-                <a:endParaRPr lang="en-US" dirty="0"/>
+                <a:endParaRPr lang="en-US" sz="2100" dirty="0"/>
               </a:p>
               <a:p>
                 <a:pPr marL="0" lvl="0" indent="0">
@@ -7587,14 +8216,14 @@
                 </a:pPr>
                 <a:r>
                   <a:rPr lang="en-US" dirty="0"/>
-                  <a:t>Note: we are neglecting the possibility of a mutations in one of the sons</a:t>
+                  <a:t>Note: we are neglecting the very low probability of a mutations in one of the sons</a:t>
                 </a:r>
                 <a:endParaRPr dirty="0"/>
               </a:p>
             </p:txBody>
           </p:sp>
         </mc:Choice>
-        <mc:Fallback xmlns="">
+        <mc:Fallback>
           <p:sp>
             <p:nvSpPr>
               <p:cNvPr id="3" name="Content Placeholder 2"/>
@@ -7606,10 +8235,14 @@
               </p:nvPr>
             </p:nvSpPr>
             <p:spPr>
+              <a:xfrm>
+                <a:off x="457200" y="1200151"/>
+                <a:ext cx="8229600" cy="3737370"/>
+              </a:xfrm>
               <a:blipFill>
                 <a:blip r:embed="rId2"/>
                 <a:stretch>
-                  <a:fillRect l="-741" t="-2693" r="-593" b="-718"/>
+                  <a:fillRect l="-741" t="-1794" r="-593"/>
                 </a:stretch>
               </a:blipFill>
             </p:spPr>
@@ -7677,8 +8310,8 @@
           </a:p>
         </p:txBody>
       </p:sp>
-      <mc:AlternateContent xmlns:mc="http://schemas.openxmlformats.org/markup-compatibility/2006" xmlns:a14="http://schemas.microsoft.com/office/drawing/2010/main">
-        <mc:Choice Requires="a14">
+      <mc:AlternateContent xmlns:mc="http://schemas.openxmlformats.org/markup-compatibility/2006">
+        <mc:Choice xmlns:a14="http://schemas.microsoft.com/office/drawing/2010/main" Requires="a14">
           <p:sp>
             <p:nvSpPr>
               <p:cNvPr id="3" name="Content Placeholder 2"/>
@@ -7692,7 +8325,7 @@
             <p:spPr/>
             <p:txBody>
               <a:bodyPr>
-                <a:normAutofit/>
+                <a:normAutofit fontScale="92500" lnSpcReduction="10000"/>
               </a:bodyPr>
               <a:lstStyle/>
               <a:p>
@@ -7730,7 +8363,7 @@
               <a:p>
                 <a:r>
                   <a:rPr lang="en-US" dirty="0"/>
-                  <a:t>We can define the quantities we need:   </a:t>
+                  <a:t>We can now define all the quantities we need:   </a:t>
                 </a:r>
                 <a:r>
                   <a:rPr lang="en-US" sz="2000" dirty="0"/>
@@ -7740,250 +8373,384 @@
               <a:p>
                 <a:r>
                   <a:rPr lang="en-US" sz="2000" dirty="0"/>
-                  <a:t>Likelihood </a:t>
+                  <a:t>Prior probability of hypothesis, no marker</a:t>
+                </a:r>
+              </a:p>
+              <a:p>
+                <a:pPr marL="0" indent="0">
+                  <a:buNone/>
+                </a:pPr>
+                <a14:m>
+                  <m:oMathPara xmlns:m="http://schemas.openxmlformats.org/officeDocument/2006/math">
+                    <m:oMathParaPr>
+                      <m:jc m:val="centerGroup"/>
+                    </m:oMathParaPr>
+                    <m:oMath xmlns:m="http://schemas.openxmlformats.org/officeDocument/2006/math">
+                      <m:r>
+                        <a:rPr lang="en-US" sz="2000" i="1">
+                          <a:latin typeface="Cambria Math" panose="02040503050406030204" pitchFamily="18" charset="0"/>
+                        </a:rPr>
+                        <m:t>𝑃</m:t>
+                      </m:r>
+                      <m:d>
+                        <m:dPr>
+                          <m:ctrlPr>
+                            <a:rPr lang="en-US" sz="2000" i="1">
+                              <a:latin typeface="Cambria Math" panose="02040503050406030204" pitchFamily="18" charset="0"/>
+                            </a:rPr>
+                          </m:ctrlPr>
+                        </m:dPr>
+                        <m:e>
+                          <m:r>
+                            <a:rPr lang="en-US" sz="2000" i="1">
+                              <a:latin typeface="Cambria Math" panose="02040503050406030204" pitchFamily="18" charset="0"/>
+                              <a:ea typeface="Cambria Math" panose="02040503050406030204" pitchFamily="18" charset="0"/>
+                            </a:rPr>
+                            <m:t>𝜃</m:t>
+                          </m:r>
+                          <m:r>
+                            <a:rPr lang="en-US" sz="2000" i="1">
+                              <a:latin typeface="Cambria Math" panose="02040503050406030204" pitchFamily="18" charset="0"/>
+                              <a:ea typeface="Cambria Math" panose="02040503050406030204" pitchFamily="18" charset="0"/>
+                            </a:rPr>
+                            <m:t>=</m:t>
+                          </m:r>
+                          <m:r>
+                            <a:rPr lang="en-US" sz="2000" b="0" i="1" smtClean="0">
+                              <a:latin typeface="Cambria Math" panose="02040503050406030204" pitchFamily="18" charset="0"/>
+                              <a:ea typeface="Cambria Math" panose="02040503050406030204" pitchFamily="18" charset="0"/>
+                            </a:rPr>
+                            <m:t>0</m:t>
+                          </m:r>
+                        </m:e>
+                      </m:d>
+                      <m:r>
+                        <a:rPr lang="en-US" sz="2000" b="0" i="1" smtClean="0">
+                          <a:latin typeface="Cambria Math" panose="02040503050406030204" pitchFamily="18" charset="0"/>
+                          <a:ea typeface="Cambria Math" panose="02040503050406030204" pitchFamily="18" charset="0"/>
+                        </a:rPr>
+                        <m:t>=</m:t>
+                      </m:r>
+                      <m:r>
+                        <a:rPr lang="en-US" sz="2000" b="0" i="1" smtClean="0">
+                          <a:latin typeface="Cambria Math" panose="02040503050406030204" pitchFamily="18" charset="0"/>
+                          <a:ea typeface="Cambria Math" panose="02040503050406030204" pitchFamily="18" charset="0"/>
+                        </a:rPr>
+                        <m:t>1</m:t>
+                      </m:r>
+                      <m:r>
+                        <a:rPr lang="en-US" sz="2000" b="0" i="1" smtClean="0">
+                          <a:latin typeface="Cambria Math" panose="02040503050406030204" pitchFamily="18" charset="0"/>
+                          <a:ea typeface="Cambria Math" panose="02040503050406030204" pitchFamily="18" charset="0"/>
+                        </a:rPr>
+                        <m:t>−</m:t>
+                      </m:r>
+                      <m:r>
+                        <a:rPr lang="en-US" sz="2000" i="1">
+                          <a:latin typeface="Cambria Math" panose="02040503050406030204" pitchFamily="18" charset="0"/>
+                        </a:rPr>
+                        <m:t>𝑃</m:t>
+                      </m:r>
+                      <m:d>
+                        <m:dPr>
+                          <m:ctrlPr>
+                            <a:rPr lang="en-US" sz="2000" i="1">
+                              <a:latin typeface="Cambria Math" panose="02040503050406030204" pitchFamily="18" charset="0"/>
+                            </a:rPr>
+                          </m:ctrlPr>
+                        </m:dPr>
+                        <m:e>
+                          <m:r>
+                            <a:rPr lang="en-US" sz="2000" i="1">
+                              <a:latin typeface="Cambria Math" panose="02040503050406030204" pitchFamily="18" charset="0"/>
+                              <a:ea typeface="Cambria Math" panose="02040503050406030204" pitchFamily="18" charset="0"/>
+                            </a:rPr>
+                            <m:t>𝜃</m:t>
+                          </m:r>
+                          <m:r>
+                            <a:rPr lang="en-US" sz="2000" i="1">
+                              <a:latin typeface="Cambria Math" panose="02040503050406030204" pitchFamily="18" charset="0"/>
+                              <a:ea typeface="Cambria Math" panose="02040503050406030204" pitchFamily="18" charset="0"/>
+                            </a:rPr>
+                            <m:t>=</m:t>
+                          </m:r>
+                          <m:r>
+                            <a:rPr lang="en-US" sz="2000" i="1">
+                              <a:latin typeface="Cambria Math" panose="02040503050406030204" pitchFamily="18" charset="0"/>
+                              <a:ea typeface="Cambria Math" panose="02040503050406030204" pitchFamily="18" charset="0"/>
+                            </a:rPr>
+                            <m:t>1</m:t>
+                          </m:r>
+                        </m:e>
+                      </m:d>
+                      <m:r>
+                        <a:rPr lang="en-US" sz="2000" b="0" i="1" smtClean="0">
+                          <a:latin typeface="Cambria Math" panose="02040503050406030204" pitchFamily="18" charset="0"/>
+                          <a:ea typeface="Cambria Math" panose="02040503050406030204" pitchFamily="18" charset="0"/>
+                        </a:rPr>
+                        <m:t>=</m:t>
+                      </m:r>
+                      <m:r>
+                        <a:rPr lang="en-US" sz="2000" b="0" i="1" smtClean="0">
+                          <a:latin typeface="Cambria Math" panose="02040503050406030204" pitchFamily="18" charset="0"/>
+                          <a:ea typeface="Cambria Math" panose="02040503050406030204" pitchFamily="18" charset="0"/>
+                        </a:rPr>
+                        <m:t>1</m:t>
+                      </m:r>
+                      <m:r>
+                        <a:rPr lang="en-US" sz="2000" b="0" i="1" smtClean="0">
+                          <a:latin typeface="Cambria Math" panose="02040503050406030204" pitchFamily="18" charset="0"/>
+                          <a:ea typeface="Cambria Math" panose="02040503050406030204" pitchFamily="18" charset="0"/>
+                        </a:rPr>
+                        <m:t>−</m:t>
+                      </m:r>
+                      <m:r>
+                        <a:rPr lang="en-US" sz="2000" b="0" i="1" smtClean="0">
+                          <a:latin typeface="Cambria Math" panose="02040503050406030204" pitchFamily="18" charset="0"/>
+                          <a:ea typeface="Cambria Math" panose="02040503050406030204" pitchFamily="18" charset="0"/>
+                        </a:rPr>
+                        <m:t>0</m:t>
+                      </m:r>
+                      <m:r>
+                        <a:rPr lang="en-US" sz="2000" b="0" i="1" smtClean="0">
+                          <a:latin typeface="Cambria Math" panose="02040503050406030204" pitchFamily="18" charset="0"/>
+                          <a:ea typeface="Cambria Math" panose="02040503050406030204" pitchFamily="18" charset="0"/>
+                        </a:rPr>
+                        <m:t>.</m:t>
+                      </m:r>
+                      <m:r>
+                        <a:rPr lang="en-US" sz="2000" b="0" i="1" smtClean="0">
+                          <a:latin typeface="Cambria Math" panose="02040503050406030204" pitchFamily="18" charset="0"/>
+                          <a:ea typeface="Cambria Math" panose="02040503050406030204" pitchFamily="18" charset="0"/>
+                        </a:rPr>
+                        <m:t>5</m:t>
+                      </m:r>
+                      <m:r>
+                        <a:rPr lang="en-US" sz="2000" i="1">
+                          <a:latin typeface="Cambria Math" panose="02040503050406030204" pitchFamily="18" charset="0"/>
+                        </a:rPr>
+                        <m:t>=</m:t>
+                      </m:r>
+                      <m:r>
+                        <a:rPr lang="en-US" sz="2000" b="0" i="1" smtClean="0">
+                          <a:latin typeface="Cambria Math" panose="02040503050406030204" pitchFamily="18" charset="0"/>
+                        </a:rPr>
+                        <m:t>0</m:t>
+                      </m:r>
+                      <m:r>
+                        <a:rPr lang="en-US" sz="2000" b="0" i="1" smtClean="0">
+                          <a:latin typeface="Cambria Math" panose="02040503050406030204" pitchFamily="18" charset="0"/>
+                        </a:rPr>
+                        <m:t>.</m:t>
+                      </m:r>
+                      <m:r>
+                        <a:rPr lang="en-US" sz="2000" b="0" i="1" smtClean="0">
+                          <a:latin typeface="Cambria Math" panose="02040503050406030204" pitchFamily="18" charset="0"/>
+                        </a:rPr>
+                        <m:t>5</m:t>
+                      </m:r>
+                    </m:oMath>
+                  </m:oMathPara>
+                </a14:m>
+                <a:endParaRPr lang="en-US" sz="2000" b="0" dirty="0"/>
+              </a:p>
+              <a:p>
+                <a:r>
+                  <a:rPr lang="en-US" sz="2000" dirty="0"/>
+                  <a:t>Likelihood of hypothesis, no marker </a:t>
+                </a:r>
+                <a:endParaRPr lang="en-US" sz="2000" b="0" i="1" dirty="0">
+                  <a:latin typeface="Cambria Math" panose="02040503050406030204" pitchFamily="18" charset="0"/>
+                </a:endParaRPr>
+              </a:p>
+              <a:p>
+                <a:pPr marL="0" indent="0">
+                  <a:buNone/>
+                </a:pPr>
+                <a14:m>
+                  <m:oMathPara xmlns:m="http://schemas.openxmlformats.org/officeDocument/2006/math">
+                    <m:oMathParaPr>
+                      <m:jc m:val="centerGroup"/>
+                    </m:oMathParaPr>
+                    <m:oMath xmlns:m="http://schemas.openxmlformats.org/officeDocument/2006/math">
+                      <m:r>
+                        <a:rPr lang="en-US" sz="2000" i="1">
+                          <a:latin typeface="Cambria Math" panose="02040503050406030204" pitchFamily="18" charset="0"/>
+                        </a:rPr>
+                        <m:t>𝑃</m:t>
+                      </m:r>
+                      <m:d>
+                        <m:dPr>
+                          <m:ctrlPr>
+                            <a:rPr lang="en-US" sz="2000" i="1">
+                              <a:latin typeface="Cambria Math" panose="02040503050406030204" pitchFamily="18" charset="0"/>
+                            </a:rPr>
+                          </m:ctrlPr>
+                        </m:dPr>
+                        <m:e>
+                          <m:sSub>
+                            <m:sSubPr>
+                              <m:ctrlPr>
+                                <a:rPr lang="en-US" sz="2000" i="1">
+                                  <a:latin typeface="Cambria Math" panose="02040503050406030204" pitchFamily="18" charset="0"/>
+                                </a:rPr>
+                              </m:ctrlPr>
+                            </m:sSubPr>
+                            <m:e>
+                              <m:r>
+                                <a:rPr lang="en-US" sz="2000" i="1">
+                                  <a:latin typeface="Cambria Math" panose="02040503050406030204" pitchFamily="18" charset="0"/>
+                                </a:rPr>
+                                <m:t>𝑥</m:t>
+                              </m:r>
+                            </m:e>
+                            <m:sub>
+                              <m:r>
+                                <a:rPr lang="en-US" sz="2000" i="1">
+                                  <a:latin typeface="Cambria Math" panose="02040503050406030204" pitchFamily="18" charset="0"/>
+                                </a:rPr>
+                                <m:t>1</m:t>
+                              </m:r>
+                            </m:sub>
+                          </m:sSub>
+                          <m:r>
+                            <a:rPr lang="en-US" sz="2000" i="1">
+                              <a:latin typeface="Cambria Math" panose="02040503050406030204" pitchFamily="18" charset="0"/>
+                            </a:rPr>
+                            <m:t>=</m:t>
+                          </m:r>
+                          <m:r>
+                            <a:rPr lang="en-US" sz="2000" i="1">
+                              <a:latin typeface="Cambria Math" panose="02040503050406030204" pitchFamily="18" charset="0"/>
+                            </a:rPr>
+                            <m:t>0</m:t>
+                          </m:r>
+                          <m:r>
+                            <a:rPr lang="en-US" sz="2000" i="1">
+                              <a:latin typeface="Cambria Math" panose="02040503050406030204" pitchFamily="18" charset="0"/>
+                            </a:rPr>
+                            <m:t>,</m:t>
+                          </m:r>
+                          <m:sSub>
+                            <m:sSubPr>
+                              <m:ctrlPr>
+                                <a:rPr lang="en-US" sz="2000" i="1">
+                                  <a:latin typeface="Cambria Math" panose="02040503050406030204" pitchFamily="18" charset="0"/>
+                                </a:rPr>
+                              </m:ctrlPr>
+                            </m:sSubPr>
+                            <m:e>
+                              <m:r>
+                                <a:rPr lang="en-US" sz="2000" i="1">
+                                  <a:latin typeface="Cambria Math" panose="02040503050406030204" pitchFamily="18" charset="0"/>
+                                </a:rPr>
+                                <m:t>𝑥</m:t>
+                              </m:r>
+                            </m:e>
+                            <m:sub>
+                              <m:r>
+                                <a:rPr lang="en-US" sz="2000" i="1">
+                                  <a:latin typeface="Cambria Math" panose="02040503050406030204" pitchFamily="18" charset="0"/>
+                                </a:rPr>
+                                <m:t>2</m:t>
+                              </m:r>
+                            </m:sub>
+                          </m:sSub>
+                          <m:r>
+                            <a:rPr lang="en-US" sz="2000" i="1">
+                              <a:latin typeface="Cambria Math" panose="02040503050406030204" pitchFamily="18" charset="0"/>
+                            </a:rPr>
+                            <m:t>=</m:t>
+                          </m:r>
+                          <m:r>
+                            <a:rPr lang="en-US" sz="2000" i="1">
+                              <a:latin typeface="Cambria Math" panose="02040503050406030204" pitchFamily="18" charset="0"/>
+                            </a:rPr>
+                            <m:t>0</m:t>
+                          </m:r>
+                          <m:r>
+                            <a:rPr lang="en-US" sz="2000" i="1">
+                              <a:latin typeface="Cambria Math" panose="02040503050406030204" pitchFamily="18" charset="0"/>
+                            </a:rPr>
+                            <m:t>| </m:t>
+                          </m:r>
+                          <m:r>
+                            <a:rPr lang="en-US" sz="2000" i="1">
+                              <a:latin typeface="Cambria Math" panose="02040503050406030204" pitchFamily="18" charset="0"/>
+                              <a:ea typeface="Cambria Math" panose="02040503050406030204" pitchFamily="18" charset="0"/>
+                            </a:rPr>
+                            <m:t>𝜃</m:t>
+                          </m:r>
+                          <m:r>
+                            <a:rPr lang="en-US" sz="2000" i="1">
+                              <a:latin typeface="Cambria Math" panose="02040503050406030204" pitchFamily="18" charset="0"/>
+                              <a:ea typeface="Cambria Math" panose="02040503050406030204" pitchFamily="18" charset="0"/>
+                            </a:rPr>
+                            <m:t>=</m:t>
+                          </m:r>
+                          <m:r>
+                            <a:rPr lang="en-US" sz="2000" i="1">
+                              <a:latin typeface="Cambria Math" panose="02040503050406030204" pitchFamily="18" charset="0"/>
+                              <a:ea typeface="Cambria Math" panose="02040503050406030204" pitchFamily="18" charset="0"/>
+                            </a:rPr>
+                            <m:t>0</m:t>
+                          </m:r>
+                          <m:r>
+                            <a:rPr lang="en-US" sz="2000" i="1">
+                              <a:latin typeface="Cambria Math" panose="02040503050406030204" pitchFamily="18" charset="0"/>
+                              <a:ea typeface="Cambria Math" panose="02040503050406030204" pitchFamily="18" charset="0"/>
+                            </a:rPr>
+                            <m:t>.</m:t>
+                          </m:r>
+                          <m:r>
+                            <a:rPr lang="en-US" sz="2000" i="1">
+                              <a:latin typeface="Cambria Math" panose="02040503050406030204" pitchFamily="18" charset="0"/>
+                              <a:ea typeface="Cambria Math" panose="02040503050406030204" pitchFamily="18" charset="0"/>
+                            </a:rPr>
+                            <m:t>0</m:t>
+                          </m:r>
+                        </m:e>
+                      </m:d>
+                      <m:r>
+                        <a:rPr lang="en-US" sz="2000" i="1">
+                          <a:latin typeface="Cambria Math" panose="02040503050406030204" pitchFamily="18" charset="0"/>
+                          <a:ea typeface="Cambria Math" panose="02040503050406030204" pitchFamily="18" charset="0"/>
+                        </a:rPr>
+                        <m:t>=</m:t>
+                      </m:r>
+                      <m:r>
+                        <a:rPr lang="en-US" sz="2000" i="1">
+                          <a:latin typeface="Cambria Math" panose="02040503050406030204" pitchFamily="18" charset="0"/>
+                          <a:ea typeface="Cambria Math" panose="02040503050406030204" pitchFamily="18" charset="0"/>
+                        </a:rPr>
+                        <m:t>1</m:t>
+                      </m:r>
+                      <m:r>
+                        <a:rPr lang="en-US" sz="2000" i="1">
+                          <a:latin typeface="Cambria Math" panose="02040503050406030204" pitchFamily="18" charset="0"/>
+                          <a:ea typeface="Cambria Math" panose="02040503050406030204" pitchFamily="18" charset="0"/>
+                        </a:rPr>
+                        <m:t>.</m:t>
+                      </m:r>
+                      <m:r>
+                        <a:rPr lang="en-US" sz="2000" i="1">
+                          <a:latin typeface="Cambria Math" panose="02040503050406030204" pitchFamily="18" charset="0"/>
+                          <a:ea typeface="Cambria Math" panose="02040503050406030204" pitchFamily="18" charset="0"/>
+                        </a:rPr>
+                        <m:t>0</m:t>
+                      </m:r>
+                    </m:oMath>
+                  </m:oMathPara>
+                </a14:m>
+                <a:endParaRPr lang="en-US" sz="2000" b="0" dirty="0"/>
+              </a:p>
+              <a:p>
+                <a:r>
+                  <a:rPr lang="en-US" sz="2000" dirty="0"/>
+                  <a:t>Prior probability of hypothesis, marker, </a:t>
                 </a:r>
                 <a14:m>
                   <m:oMath xmlns:m="http://schemas.openxmlformats.org/officeDocument/2006/math">
-                    <m:r>
-                      <a:rPr lang="en-US" sz="2000" b="0" i="1" smtClean="0">
-                        <a:latin typeface="Cambria Math" panose="02040503050406030204" pitchFamily="18" charset="0"/>
-                      </a:rPr>
-                      <m:t>=</m:t>
-                    </m:r>
-                    <m:r>
-                      <a:rPr lang="en-US" sz="2000" b="0" i="1" smtClean="0">
-                        <a:latin typeface="Cambria Math" panose="02040503050406030204" pitchFamily="18" charset="0"/>
-                      </a:rPr>
-                      <m:t>𝑃</m:t>
-                    </m:r>
-                    <m:d>
-                      <m:dPr>
-                        <m:ctrlPr>
-                          <a:rPr lang="en-US" sz="2000" b="0" i="1" smtClean="0">
-                            <a:latin typeface="Cambria Math" panose="02040503050406030204" pitchFamily="18" charset="0"/>
-                          </a:rPr>
-                        </m:ctrlPr>
-                      </m:dPr>
-                      <m:e>
-                        <m:r>
-                          <a:rPr lang="en-US" sz="2000" b="0" i="1" smtClean="0">
-                            <a:latin typeface="Cambria Math" panose="02040503050406030204" pitchFamily="18" charset="0"/>
-                          </a:rPr>
-                          <m:t>𝑋</m:t>
-                        </m:r>
-                        <m:r>
-                          <a:rPr lang="en-US" sz="2000" b="0" i="1" smtClean="0">
-                            <a:latin typeface="Cambria Math" panose="02040503050406030204" pitchFamily="18" charset="0"/>
-                          </a:rPr>
-                          <m:t> | </m:t>
-                        </m:r>
-                        <m:r>
-                          <a:rPr lang="en-US" sz="2000" b="0" i="1" smtClean="0">
-                            <a:latin typeface="Cambria Math" panose="02040503050406030204" pitchFamily="18" charset="0"/>
-                            <a:ea typeface="Cambria Math" panose="02040503050406030204" pitchFamily="18" charset="0"/>
-                          </a:rPr>
-                          <m:t>𝜃</m:t>
-                        </m:r>
-                        <m:r>
-                          <a:rPr lang="en-US" sz="2000" b="0" i="1" smtClean="0">
-                            <a:latin typeface="Cambria Math" panose="02040503050406030204" pitchFamily="18" charset="0"/>
-                            <a:ea typeface="Cambria Math" panose="02040503050406030204" pitchFamily="18" charset="0"/>
-                          </a:rPr>
-                          <m:t>=</m:t>
-                        </m:r>
-                        <m:r>
-                          <a:rPr lang="en-US" sz="2000" b="0" i="1" smtClean="0">
-                            <a:latin typeface="Cambria Math" panose="02040503050406030204" pitchFamily="18" charset="0"/>
-                            <a:ea typeface="Cambria Math" panose="02040503050406030204" pitchFamily="18" charset="0"/>
-                          </a:rPr>
-                          <m:t>1</m:t>
-                        </m:r>
-                      </m:e>
-                    </m:d>
-                    <m:r>
-                      <a:rPr lang="en-US" sz="2000" b="0" i="1" smtClean="0">
-                        <a:latin typeface="Cambria Math" panose="02040503050406030204" pitchFamily="18" charset="0"/>
-                      </a:rPr>
-                      <m:t>=</m:t>
-                    </m:r>
-                    <m:r>
-                      <a:rPr lang="en-US" sz="2000" b="0" i="1" smtClean="0">
-                        <a:latin typeface="Cambria Math" panose="02040503050406030204" pitchFamily="18" charset="0"/>
-                      </a:rPr>
-                      <m:t>0</m:t>
-                    </m:r>
-                    <m:r>
-                      <a:rPr lang="en-US" sz="2000" b="0" i="1" smtClean="0">
-                        <a:latin typeface="Cambria Math" panose="02040503050406030204" pitchFamily="18" charset="0"/>
-                      </a:rPr>
-                      <m:t>.</m:t>
-                    </m:r>
-                    <m:r>
-                      <a:rPr lang="en-US" sz="2000" b="0" i="1" smtClean="0">
-                        <a:latin typeface="Cambria Math" panose="02040503050406030204" pitchFamily="18" charset="0"/>
-                      </a:rPr>
-                      <m:t>5</m:t>
-                    </m:r>
-                    <m:r>
-                      <a:rPr lang="en-US" sz="2000" b="0" i="1" smtClean="0">
-                        <a:latin typeface="Cambria Math" panose="02040503050406030204" pitchFamily="18" charset="0"/>
-                        <a:ea typeface="Cambria Math" panose="02040503050406030204" pitchFamily="18" charset="0"/>
-                      </a:rPr>
-                      <m:t>×</m:t>
-                    </m:r>
-                    <m:r>
-                      <a:rPr lang="en-US" sz="2000" b="0" i="1" smtClean="0">
-                        <a:latin typeface="Cambria Math" panose="02040503050406030204" pitchFamily="18" charset="0"/>
-                        <a:ea typeface="Cambria Math" panose="02040503050406030204" pitchFamily="18" charset="0"/>
-                      </a:rPr>
-                      <m:t>0</m:t>
-                    </m:r>
-                    <m:r>
-                      <a:rPr lang="en-US" sz="2000" b="0" i="1" smtClean="0">
-                        <a:latin typeface="Cambria Math" panose="02040503050406030204" pitchFamily="18" charset="0"/>
-                        <a:ea typeface="Cambria Math" panose="02040503050406030204" pitchFamily="18" charset="0"/>
-                      </a:rPr>
-                      <m:t>.</m:t>
-                    </m:r>
-                    <m:r>
-                      <a:rPr lang="en-US" sz="2000" b="0" i="1" smtClean="0">
-                        <a:latin typeface="Cambria Math" panose="02040503050406030204" pitchFamily="18" charset="0"/>
-                        <a:ea typeface="Cambria Math" panose="02040503050406030204" pitchFamily="18" charset="0"/>
-                      </a:rPr>
-                      <m:t>5</m:t>
-                    </m:r>
-                    <m:r>
-                      <a:rPr lang="en-US" sz="2000" b="0" i="1" smtClean="0">
-                        <a:latin typeface="Cambria Math" panose="02040503050406030204" pitchFamily="18" charset="0"/>
-                        <a:ea typeface="Cambria Math" panose="02040503050406030204" pitchFamily="18" charset="0"/>
-                      </a:rPr>
-                      <m:t>=</m:t>
-                    </m:r>
-                    <m:r>
-                      <a:rPr lang="en-US" sz="2000" b="0" i="1" smtClean="0">
-                        <a:latin typeface="Cambria Math" panose="02040503050406030204" pitchFamily="18" charset="0"/>
-                        <a:ea typeface="Cambria Math" panose="02040503050406030204" pitchFamily="18" charset="0"/>
-                      </a:rPr>
-                      <m:t>0</m:t>
-                    </m:r>
-                    <m:r>
-                      <a:rPr lang="en-US" sz="2000" b="0" i="1" smtClean="0">
-                        <a:latin typeface="Cambria Math" panose="02040503050406030204" pitchFamily="18" charset="0"/>
-                        <a:ea typeface="Cambria Math" panose="02040503050406030204" pitchFamily="18" charset="0"/>
-                      </a:rPr>
-                      <m:t>.</m:t>
-                    </m:r>
-                    <m:r>
-                      <a:rPr lang="en-US" sz="2000" b="0" i="1" smtClean="0">
-                        <a:latin typeface="Cambria Math" panose="02040503050406030204" pitchFamily="18" charset="0"/>
-                        <a:ea typeface="Cambria Math" panose="02040503050406030204" pitchFamily="18" charset="0"/>
-                      </a:rPr>
-                      <m:t>25</m:t>
-                    </m:r>
-                  </m:oMath>
-                </a14:m>
-                <a:endParaRPr lang="en-US" sz="2000" dirty="0"/>
-              </a:p>
-              <a:p>
-                <a:r>
-                  <a:rPr lang="en-US" sz="2000" dirty="0"/>
-                  <a:t>Prior priority </a:t>
-                </a:r>
-                <a14:m>
-                  <m:oMath xmlns:m="http://schemas.openxmlformats.org/officeDocument/2006/math">
-                    <m:r>
-                      <a:rPr lang="en-US" sz="2000" b="0" i="1" smtClean="0">
-                        <a:latin typeface="Cambria Math" panose="02040503050406030204" pitchFamily="18" charset="0"/>
-                      </a:rPr>
-                      <m:t>=</m:t>
-                    </m:r>
-                  </m:oMath>
-                </a14:m>
-                <a:r>
-                  <a:rPr lang="en-US" sz="2000" dirty="0"/>
-                  <a:t> </a:t>
-                </a:r>
-                <a14:m>
-                  <m:oMath xmlns:m="http://schemas.openxmlformats.org/officeDocument/2006/math">
-                    <m:r>
-                      <a:rPr lang="en-US" sz="2000" i="1">
-                        <a:latin typeface="Cambria Math" panose="02040503050406030204" pitchFamily="18" charset="0"/>
-                      </a:rPr>
-                      <m:t>𝑃</m:t>
-                    </m:r>
-                    <m:d>
-                      <m:dPr>
-                        <m:ctrlPr>
-                          <a:rPr lang="en-US" sz="2000" i="1">
-                            <a:latin typeface="Cambria Math" panose="02040503050406030204" pitchFamily="18" charset="0"/>
-                          </a:rPr>
-                        </m:ctrlPr>
-                      </m:dPr>
-                      <m:e>
-                        <m:r>
-                          <a:rPr lang="en-US" sz="2000" i="1">
-                            <a:latin typeface="Cambria Math" panose="02040503050406030204" pitchFamily="18" charset="0"/>
-                            <a:ea typeface="Cambria Math" panose="02040503050406030204" pitchFamily="18" charset="0"/>
-                          </a:rPr>
-                          <m:t>𝜃</m:t>
-                        </m:r>
-                        <m:r>
-                          <a:rPr lang="en-US" sz="2000" i="1">
-                            <a:latin typeface="Cambria Math" panose="02040503050406030204" pitchFamily="18" charset="0"/>
-                            <a:ea typeface="Cambria Math" panose="02040503050406030204" pitchFamily="18" charset="0"/>
-                          </a:rPr>
-                          <m:t>=</m:t>
-                        </m:r>
-                        <m:r>
-                          <a:rPr lang="en-US" sz="2000" i="1">
-                            <a:latin typeface="Cambria Math" panose="02040503050406030204" pitchFamily="18" charset="0"/>
-                            <a:ea typeface="Cambria Math" panose="02040503050406030204" pitchFamily="18" charset="0"/>
-                          </a:rPr>
-                          <m:t>1</m:t>
-                        </m:r>
-                      </m:e>
-                    </m:d>
-                    <m:r>
-                      <a:rPr lang="en-US" sz="2000" i="1">
-                        <a:latin typeface="Cambria Math" panose="02040503050406030204" pitchFamily="18" charset="0"/>
-                      </a:rPr>
-                      <m:t>=</m:t>
-                    </m:r>
-                    <m:r>
-                      <a:rPr lang="en-US" sz="2000" b="0" i="1" smtClean="0">
-                        <a:latin typeface="Cambria Math" panose="02040503050406030204" pitchFamily="18" charset="0"/>
-                      </a:rPr>
-                      <m:t>1</m:t>
-                    </m:r>
-                    <m:r>
-                      <a:rPr lang="en-US" sz="2000" b="0" i="1" smtClean="0">
-                        <a:latin typeface="Cambria Math" panose="02040503050406030204" pitchFamily="18" charset="0"/>
-                      </a:rPr>
-                      <m:t>.</m:t>
-                    </m:r>
-                    <m:r>
-                      <a:rPr lang="en-US" sz="2000" b="0" i="1" smtClean="0">
-                        <a:latin typeface="Cambria Math" panose="02040503050406030204" pitchFamily="18" charset="0"/>
-                      </a:rPr>
-                      <m:t>0</m:t>
-                    </m:r>
-                  </m:oMath>
-                </a14:m>
-                <a:endParaRPr lang="en-US" sz="2000" dirty="0"/>
-              </a:p>
-              <a:p>
-                <a:r>
-                  <a:rPr lang="en-US" sz="2000" dirty="0"/>
-                  <a:t>Probability of hypothesis, no marker </a:t>
-                </a:r>
-                <a14:m>
-                  <m:oMath xmlns:m="http://schemas.openxmlformats.org/officeDocument/2006/math">
-                    <m:r>
-                      <a:rPr lang="en-US" sz="2000" b="0" i="1" smtClean="0">
-                        <a:latin typeface="Cambria Math" panose="02040503050406030204" pitchFamily="18" charset="0"/>
-                      </a:rPr>
-                      <m:t>=</m:t>
-                    </m:r>
                     <m:r>
                       <a:rPr lang="en-US" sz="2000" i="1">
                         <a:latin typeface="Cambria Math" panose="02040503050406030204" pitchFamily="18" charset="0"/>
@@ -8018,156 +8785,6 @@
                             <a:latin typeface="Cambria Math" panose="02040503050406030204" pitchFamily="18" charset="0"/>
                             <a:ea typeface="Cambria Math" panose="02040503050406030204" pitchFamily="18" charset="0"/>
                           </a:rPr>
-                          <m:t>0</m:t>
-                        </m:r>
-                      </m:e>
-                    </m:d>
-                    <m:r>
-                      <a:rPr lang="en-US" sz="2000" b="0" i="1" smtClean="0">
-                        <a:latin typeface="Cambria Math" panose="02040503050406030204" pitchFamily="18" charset="0"/>
-                        <a:ea typeface="Cambria Math" panose="02040503050406030204" pitchFamily="18" charset="0"/>
-                      </a:rPr>
-                      <m:t>=</m:t>
-                    </m:r>
-                    <m:r>
-                      <a:rPr lang="en-US" sz="2000" b="0" i="1" smtClean="0">
-                        <a:latin typeface="Cambria Math" panose="02040503050406030204" pitchFamily="18" charset="0"/>
-                        <a:ea typeface="Cambria Math" panose="02040503050406030204" pitchFamily="18" charset="0"/>
-                      </a:rPr>
-                      <m:t>1</m:t>
-                    </m:r>
-                    <m:r>
-                      <a:rPr lang="en-US" sz="2000" b="0" i="1" smtClean="0">
-                        <a:latin typeface="Cambria Math" panose="02040503050406030204" pitchFamily="18" charset="0"/>
-                        <a:ea typeface="Cambria Math" panose="02040503050406030204" pitchFamily="18" charset="0"/>
-                      </a:rPr>
-                      <m:t>−</m:t>
-                    </m:r>
-                    <m:r>
-                      <a:rPr lang="en-US" sz="2000" i="1">
-                        <a:latin typeface="Cambria Math" panose="02040503050406030204" pitchFamily="18" charset="0"/>
-                      </a:rPr>
-                      <m:t>𝑃</m:t>
-                    </m:r>
-                    <m:d>
-                      <m:dPr>
-                        <m:ctrlPr>
-                          <a:rPr lang="en-US" sz="2000" i="1">
-                            <a:latin typeface="Cambria Math" panose="02040503050406030204" pitchFamily="18" charset="0"/>
-                          </a:rPr>
-                        </m:ctrlPr>
-                      </m:dPr>
-                      <m:e>
-                        <m:r>
-                          <a:rPr lang="en-US" sz="2000" i="1">
-                            <a:latin typeface="Cambria Math" panose="02040503050406030204" pitchFamily="18" charset="0"/>
-                            <a:ea typeface="Cambria Math" panose="02040503050406030204" pitchFamily="18" charset="0"/>
-                          </a:rPr>
-                          <m:t>𝜃</m:t>
-                        </m:r>
-                        <m:r>
-                          <a:rPr lang="en-US" sz="2000" i="1">
-                            <a:latin typeface="Cambria Math" panose="02040503050406030204" pitchFamily="18" charset="0"/>
-                            <a:ea typeface="Cambria Math" panose="02040503050406030204" pitchFamily="18" charset="0"/>
-                          </a:rPr>
-                          <m:t>=</m:t>
-                        </m:r>
-                        <m:r>
-                          <a:rPr lang="en-US" sz="2000" i="1">
-                            <a:latin typeface="Cambria Math" panose="02040503050406030204" pitchFamily="18" charset="0"/>
-                            <a:ea typeface="Cambria Math" panose="02040503050406030204" pitchFamily="18" charset="0"/>
-                          </a:rPr>
-                          <m:t>1</m:t>
-                        </m:r>
-                      </m:e>
-                    </m:d>
-                    <m:r>
-                      <a:rPr lang="en-US" sz="2000" b="0" i="1" smtClean="0">
-                        <a:latin typeface="Cambria Math" panose="02040503050406030204" pitchFamily="18" charset="0"/>
-                        <a:ea typeface="Cambria Math" panose="02040503050406030204" pitchFamily="18" charset="0"/>
-                      </a:rPr>
-                      <m:t>=</m:t>
-                    </m:r>
-                    <m:r>
-                      <a:rPr lang="en-US" sz="2000" b="0" i="1" smtClean="0">
-                        <a:latin typeface="Cambria Math" panose="02040503050406030204" pitchFamily="18" charset="0"/>
-                        <a:ea typeface="Cambria Math" panose="02040503050406030204" pitchFamily="18" charset="0"/>
-                      </a:rPr>
-                      <m:t>0</m:t>
-                    </m:r>
-                    <m:r>
-                      <a:rPr lang="en-US" sz="2000" b="0" i="1" smtClean="0">
-                        <a:latin typeface="Cambria Math" panose="02040503050406030204" pitchFamily="18" charset="0"/>
-                        <a:ea typeface="Cambria Math" panose="02040503050406030204" pitchFamily="18" charset="0"/>
-                      </a:rPr>
-                      <m:t>.</m:t>
-                    </m:r>
-                    <m:r>
-                      <a:rPr lang="en-US" sz="2000" b="0" i="1" smtClean="0">
-                        <a:latin typeface="Cambria Math" panose="02040503050406030204" pitchFamily="18" charset="0"/>
-                        <a:ea typeface="Cambria Math" panose="02040503050406030204" pitchFamily="18" charset="0"/>
-                      </a:rPr>
-                      <m:t>5</m:t>
-                    </m:r>
-                  </m:oMath>
-                </a14:m>
-                <a:endParaRPr lang="en-US" sz="2000" dirty="0"/>
-              </a:p>
-              <a:p>
-                <a:r>
-                  <a:rPr lang="en-US" sz="2000" dirty="0"/>
-                  <a:t>Probability of hypothesis, marker </a:t>
-                </a:r>
-                <a14:m>
-                  <m:oMath xmlns:m="http://schemas.openxmlformats.org/officeDocument/2006/math">
-                    <m:r>
-                      <a:rPr lang="en-US" sz="2000" b="0" i="1" smtClean="0">
-                        <a:latin typeface="Cambria Math" panose="02040503050406030204" pitchFamily="18" charset="0"/>
-                      </a:rPr>
-                      <m:t>=</m:t>
-                    </m:r>
-                  </m:oMath>
-                </a14:m>
-                <a:r>
-                  <a:rPr lang="en-US" sz="2000" dirty="0"/>
-                  <a:t> </a:t>
-                </a:r>
-                <a14:m>
-                  <m:oMath xmlns:m="http://schemas.openxmlformats.org/officeDocument/2006/math">
-                    <m:r>
-                      <a:rPr lang="en-US" sz="2000" i="1">
-                        <a:latin typeface="Cambria Math" panose="02040503050406030204" pitchFamily="18" charset="0"/>
-                      </a:rPr>
-                      <m:t>𝑃</m:t>
-                    </m:r>
-                    <m:d>
-                      <m:dPr>
-                        <m:ctrlPr>
-                          <a:rPr lang="en-US" sz="2000" i="1">
-                            <a:latin typeface="Cambria Math" panose="02040503050406030204" pitchFamily="18" charset="0"/>
-                          </a:rPr>
-                        </m:ctrlPr>
-                      </m:dPr>
-                      <m:e>
-                        <m:r>
-                          <a:rPr lang="en-US" sz="2000" i="1">
-                            <a:latin typeface="Cambria Math" panose="02040503050406030204" pitchFamily="18" charset="0"/>
-                            <a:ea typeface="Cambria Math" panose="02040503050406030204" pitchFamily="18" charset="0"/>
-                          </a:rPr>
-                          <m:t>𝜃</m:t>
-                        </m:r>
-                        <m:r>
-                          <a:rPr lang="en-US" sz="2000" i="1">
-                            <a:latin typeface="Cambria Math" panose="02040503050406030204" pitchFamily="18" charset="0"/>
-                            <a:ea typeface="Cambria Math" panose="02040503050406030204" pitchFamily="18" charset="0"/>
-                          </a:rPr>
-                          <m:t>=</m:t>
-                        </m:r>
-                        <m:r>
-                          <a:rPr lang="en-US" sz="2000" i="1">
-                            <a:latin typeface="Cambria Math" panose="02040503050406030204" pitchFamily="18" charset="0"/>
-                            <a:ea typeface="Cambria Math" panose="02040503050406030204" pitchFamily="18" charset="0"/>
-                          </a:rPr>
                           <m:t>1</m:t>
                         </m:r>
                       </m:e>
@@ -8182,7 +8799,7 @@
                       <a:rPr lang="en-US" sz="2000" b="0" i="1" smtClean="0">
                         <a:latin typeface="Cambria Math" panose="02040503050406030204" pitchFamily="18" charset="0"/>
                       </a:rPr>
-                      <m:t>1</m:t>
+                      <m:t>0</m:t>
                     </m:r>
                     <m:r>
                       <a:rPr lang="en-US" sz="2000" b="0" i="1" smtClean="0">
@@ -8194,19 +8811,209 @@
                       <a:rPr lang="en-US" sz="2000" b="0" i="1" smtClean="0">
                         <a:latin typeface="Cambria Math" panose="02040503050406030204" pitchFamily="18" charset="0"/>
                       </a:rPr>
-                      <m:t>0</m:t>
+                      <m:t>5</m:t>
                     </m:r>
                   </m:oMath>
                 </a14:m>
+                <a:endParaRPr lang="en-US" sz="2000" b="0" dirty="0"/>
+              </a:p>
+              <a:p>
+                <a:r>
+                  <a:rPr lang="en-US" sz="2000" dirty="0"/>
+                  <a:t>Likelihood of hypothesis, marker</a:t>
+                </a:r>
+              </a:p>
+              <a:p>
+                <a:pPr marL="0" indent="0">
+                  <a:buNone/>
+                </a:pPr>
+                <a14:m>
+                  <m:oMathPara xmlns:m="http://schemas.openxmlformats.org/officeDocument/2006/math">
+                    <m:oMathParaPr>
+                      <m:jc m:val="centerGroup"/>
+                    </m:oMathParaPr>
+                    <m:oMath xmlns:m="http://schemas.openxmlformats.org/officeDocument/2006/math">
+                      <m:r>
+                        <a:rPr lang="en-US" sz="2000" b="0" i="1" smtClean="0">
+                          <a:latin typeface="Cambria Math" panose="02040503050406030204" pitchFamily="18" charset="0"/>
+                        </a:rPr>
+                        <m:t>𝑃</m:t>
+                      </m:r>
+                      <m:d>
+                        <m:dPr>
+                          <m:ctrlPr>
+                            <a:rPr lang="en-US" sz="2000" b="0" i="1" smtClean="0">
+                              <a:latin typeface="Cambria Math" panose="02040503050406030204" pitchFamily="18" charset="0"/>
+                            </a:rPr>
+                          </m:ctrlPr>
+                        </m:dPr>
+                        <m:e>
+                          <m:sSub>
+                            <m:sSubPr>
+                              <m:ctrlPr>
+                                <a:rPr lang="en-US" sz="2000" b="0" i="1" smtClean="0">
+                                  <a:latin typeface="Cambria Math" panose="02040503050406030204" pitchFamily="18" charset="0"/>
+                                </a:rPr>
+                              </m:ctrlPr>
+                            </m:sSubPr>
+                            <m:e>
+                              <m:r>
+                                <a:rPr lang="en-US" sz="2000" b="0" i="1" smtClean="0">
+                                  <a:latin typeface="Cambria Math" panose="02040503050406030204" pitchFamily="18" charset="0"/>
+                                </a:rPr>
+                                <m:t>𝑥</m:t>
+                              </m:r>
+                            </m:e>
+                            <m:sub>
+                              <m:r>
+                                <a:rPr lang="en-US" sz="2000" b="0" i="1" smtClean="0">
+                                  <a:latin typeface="Cambria Math" panose="02040503050406030204" pitchFamily="18" charset="0"/>
+                                </a:rPr>
+                                <m:t>1</m:t>
+                              </m:r>
+                            </m:sub>
+                          </m:sSub>
+                          <m:r>
+                            <a:rPr lang="en-US" sz="2000" b="0" i="1" smtClean="0">
+                              <a:latin typeface="Cambria Math" panose="02040503050406030204" pitchFamily="18" charset="0"/>
+                            </a:rPr>
+                            <m:t>=</m:t>
+                          </m:r>
+                          <m:r>
+                            <a:rPr lang="en-US" sz="2000" b="0" i="1" smtClean="0">
+                              <a:latin typeface="Cambria Math" panose="02040503050406030204" pitchFamily="18" charset="0"/>
+                            </a:rPr>
+                            <m:t>0</m:t>
+                          </m:r>
+                          <m:r>
+                            <a:rPr lang="en-US" sz="2000" b="0" i="1" smtClean="0">
+                              <a:latin typeface="Cambria Math" panose="02040503050406030204" pitchFamily="18" charset="0"/>
+                            </a:rPr>
+                            <m:t>,</m:t>
+                          </m:r>
+                          <m:sSub>
+                            <m:sSubPr>
+                              <m:ctrlPr>
+                                <a:rPr lang="en-US" sz="2000" b="0" i="1" smtClean="0">
+                                  <a:latin typeface="Cambria Math" panose="02040503050406030204" pitchFamily="18" charset="0"/>
+                                </a:rPr>
+                              </m:ctrlPr>
+                            </m:sSubPr>
+                            <m:e>
+                              <m:r>
+                                <a:rPr lang="en-US" sz="2000" b="0" i="1" smtClean="0">
+                                  <a:latin typeface="Cambria Math" panose="02040503050406030204" pitchFamily="18" charset="0"/>
+                                </a:rPr>
+                                <m:t>𝑥</m:t>
+                              </m:r>
+                            </m:e>
+                            <m:sub>
+                              <m:r>
+                                <a:rPr lang="en-US" sz="2000" b="0" i="1" smtClean="0">
+                                  <a:latin typeface="Cambria Math" panose="02040503050406030204" pitchFamily="18" charset="0"/>
+                                </a:rPr>
+                                <m:t>2</m:t>
+                              </m:r>
+                            </m:sub>
+                          </m:sSub>
+                          <m:r>
+                            <a:rPr lang="en-US" sz="2000" b="0" i="1" smtClean="0">
+                              <a:latin typeface="Cambria Math" panose="02040503050406030204" pitchFamily="18" charset="0"/>
+                            </a:rPr>
+                            <m:t>=</m:t>
+                          </m:r>
+                          <m:r>
+                            <a:rPr lang="en-US" sz="2000" b="0" i="1" smtClean="0">
+                              <a:latin typeface="Cambria Math" panose="02040503050406030204" pitchFamily="18" charset="0"/>
+                            </a:rPr>
+                            <m:t>0</m:t>
+                          </m:r>
+                          <m:r>
+                            <a:rPr lang="en-US" sz="2000" b="0" i="1" smtClean="0">
+                              <a:latin typeface="Cambria Math" panose="02040503050406030204" pitchFamily="18" charset="0"/>
+                            </a:rPr>
+                            <m:t>| </m:t>
+                          </m:r>
+                          <m:r>
+                            <a:rPr lang="en-US" sz="2000" b="0" i="1" smtClean="0">
+                              <a:latin typeface="Cambria Math" panose="02040503050406030204" pitchFamily="18" charset="0"/>
+                              <a:ea typeface="Cambria Math" panose="02040503050406030204" pitchFamily="18" charset="0"/>
+                            </a:rPr>
+                            <m:t>𝜃</m:t>
+                          </m:r>
+                          <m:r>
+                            <a:rPr lang="en-US" sz="2000" b="0" i="1" smtClean="0">
+                              <a:latin typeface="Cambria Math" panose="02040503050406030204" pitchFamily="18" charset="0"/>
+                              <a:ea typeface="Cambria Math" panose="02040503050406030204" pitchFamily="18" charset="0"/>
+                            </a:rPr>
+                            <m:t>=</m:t>
+                          </m:r>
+                          <m:r>
+                            <a:rPr lang="en-US" sz="2000" b="0" i="1" smtClean="0">
+                              <a:latin typeface="Cambria Math" panose="02040503050406030204" pitchFamily="18" charset="0"/>
+                              <a:ea typeface="Cambria Math" panose="02040503050406030204" pitchFamily="18" charset="0"/>
+                            </a:rPr>
+                            <m:t>1</m:t>
+                          </m:r>
+                          <m:r>
+                            <a:rPr lang="en-US" sz="2000" b="0" i="1" smtClean="0">
+                              <a:latin typeface="Cambria Math" panose="02040503050406030204" pitchFamily="18" charset="0"/>
+                              <a:ea typeface="Cambria Math" panose="02040503050406030204" pitchFamily="18" charset="0"/>
+                            </a:rPr>
+                            <m:t>.</m:t>
+                          </m:r>
+                          <m:r>
+                            <a:rPr lang="en-US" sz="2000" b="0" i="1" smtClean="0">
+                              <a:latin typeface="Cambria Math" panose="02040503050406030204" pitchFamily="18" charset="0"/>
+                              <a:ea typeface="Cambria Math" panose="02040503050406030204" pitchFamily="18" charset="0"/>
+                            </a:rPr>
+                            <m:t>0</m:t>
+                          </m:r>
+                        </m:e>
+                      </m:d>
+                      <m:r>
+                        <a:rPr lang="en-US" sz="2000" i="1">
+                          <a:latin typeface="Cambria Math" panose="02040503050406030204" pitchFamily="18" charset="0"/>
+                          <a:ea typeface="Cambria Math" panose="02040503050406030204" pitchFamily="18" charset="0"/>
+                        </a:rPr>
+                        <m:t>=</m:t>
+                      </m:r>
+                      <m:r>
+                        <a:rPr lang="en-US" sz="2000" i="1">
+                          <a:latin typeface="Cambria Math" panose="02040503050406030204" pitchFamily="18" charset="0"/>
+                          <a:ea typeface="Cambria Math" panose="02040503050406030204" pitchFamily="18" charset="0"/>
+                        </a:rPr>
+                        <m:t>0</m:t>
+                      </m:r>
+                      <m:r>
+                        <a:rPr lang="en-US" sz="2000" i="1">
+                          <a:latin typeface="Cambria Math" panose="02040503050406030204" pitchFamily="18" charset="0"/>
+                          <a:ea typeface="Cambria Math" panose="02040503050406030204" pitchFamily="18" charset="0"/>
+                        </a:rPr>
+                        <m:t>.</m:t>
+                      </m:r>
+                      <m:r>
+                        <a:rPr lang="en-US" sz="2000" i="1">
+                          <a:latin typeface="Cambria Math" panose="02040503050406030204" pitchFamily="18" charset="0"/>
+                          <a:ea typeface="Cambria Math" panose="02040503050406030204" pitchFamily="18" charset="0"/>
+                        </a:rPr>
+                        <m:t>25</m:t>
+                      </m:r>
+                    </m:oMath>
+                  </m:oMathPara>
+                </a14:m>
                 <a:endParaRPr lang="en-US" sz="2000" dirty="0"/>
               </a:p>
               <a:p>
+                <a:pPr marL="0" indent="0">
+                  <a:buNone/>
+                </a:pPr>
                 <a:endParaRPr dirty="0"/>
               </a:p>
             </p:txBody>
           </p:sp>
         </mc:Choice>
-        <mc:Fallback xmlns="">
+        <mc:Fallback>
           <p:sp>
             <p:nvSpPr>
               <p:cNvPr id="3" name="Content Placeholder 2"/>
@@ -8219,9 +9026,9 @@
             </p:nvSpPr>
             <p:spPr>
               <a:blipFill>
-                <a:blip r:embed="rId2"/>
+                <a:blip r:embed="rId3"/>
                 <a:stretch>
-                  <a:fillRect l="-1111" t="-1436"/>
+                  <a:fillRect l="-963" t="-2334"/>
                 </a:stretch>
               </a:blipFill>
             </p:spPr>
@@ -8289,8 +9096,8 @@
           </a:p>
         </p:txBody>
       </p:sp>
-      <mc:AlternateContent xmlns:mc="http://schemas.openxmlformats.org/markup-compatibility/2006" xmlns:a14="http://schemas.microsoft.com/office/drawing/2010/main">
-        <mc:Choice Requires="a14">
+      <mc:AlternateContent xmlns:mc="http://schemas.openxmlformats.org/markup-compatibility/2006">
+        <mc:Choice xmlns:a14="http://schemas.microsoft.com/office/drawing/2010/main" Requires="a14">
           <p:sp>
             <p:nvSpPr>
               <p:cNvPr id="3" name="Content Placeholder 2"/>
@@ -8301,10 +9108,15 @@
                 <p:ph idx="1"/>
               </p:nvPr>
             </p:nvSpPr>
-            <p:spPr/>
+            <p:spPr>
+              <a:xfrm>
+                <a:off x="457200" y="1063229"/>
+                <a:ext cx="8229600" cy="3879849"/>
+              </a:xfrm>
+            </p:spPr>
             <p:txBody>
               <a:bodyPr>
-                <a:normAutofit/>
+                <a:normAutofit lnSpcReduction="10000"/>
               </a:bodyPr>
               <a:lstStyle/>
               <a:p>
@@ -8977,18 +9789,318 @@
                 </a:r>
                 <a:r>
                   <a:rPr lang="en-US" b="1" dirty="0"/>
-                  <a:t>update our belief </a:t>
+                  <a:t>update our </a:t>
+                </a:r>
+                <a:r>
+                  <a:rPr lang="en-US" b="1"/>
+                  <a:t>belief </a:t>
+                </a:r>
+                <a:r>
+                  <a:rPr lang="en-US"/>
+                  <a:t>for </a:t>
                 </a:r>
                 <a:r>
                   <a:rPr lang="en-US" dirty="0"/>
-                  <a:t>that the probability of the woman carrying the disease</a:t>
-                </a:r>
+                  <a:t>the woman carrying the disease</a:t>
+                </a:r>
+              </a:p>
+              <a:p>
+                <a:pPr marL="0" indent="0">
+                  <a:buNone/>
+                </a:pPr>
+                <a14:m>
+                  <m:oMathPara xmlns:m="http://schemas.openxmlformats.org/officeDocument/2006/math">
+                    <m:oMathParaPr>
+                      <m:jc m:val="centerGroup"/>
+                    </m:oMathParaPr>
+                    <m:oMath xmlns:m="http://schemas.openxmlformats.org/officeDocument/2006/math">
+                      <m:limLow>
+                        <m:limLowPr>
+                          <m:ctrlPr>
+                            <a:rPr lang="en-US" i="1">
+                              <a:latin typeface="Cambria Math" panose="02040503050406030204" pitchFamily="18" charset="0"/>
+                            </a:rPr>
+                          </m:ctrlPr>
+                        </m:limLowPr>
+                        <m:e>
+                          <m:r>
+                            <a:rPr lang="en-US" i="1">
+                              <a:latin typeface="Cambria Math" panose="02040503050406030204" pitchFamily="18" charset="0"/>
+                            </a:rPr>
+                            <m:t>𝑃</m:t>
+                          </m:r>
+                          <m:d>
+                            <m:dPr>
+                              <m:ctrlPr>
+                                <a:rPr lang="en-US" i="1">
+                                  <a:latin typeface="Cambria Math" panose="02040503050406030204" pitchFamily="18" charset="0"/>
+                                </a:rPr>
+                              </m:ctrlPr>
+                            </m:dPr>
+                            <m:e>
+                              <m:r>
+                                <a:rPr lang="en-US" i="1">
+                                  <a:latin typeface="Cambria Math" panose="02040503050406030204" pitchFamily="18" charset="0"/>
+                                  <a:ea typeface="Cambria Math" panose="02040503050406030204" pitchFamily="18" charset="0"/>
+                                </a:rPr>
+                                <m:t>𝜃</m:t>
+                              </m:r>
+                              <m:r>
+                                <a:rPr lang="en-US" i="1">
+                                  <a:latin typeface="Cambria Math" panose="02040503050406030204" pitchFamily="18" charset="0"/>
+                                  <a:ea typeface="Cambria Math" panose="02040503050406030204" pitchFamily="18" charset="0"/>
+                                </a:rPr>
+                                <m:t>=</m:t>
+                              </m:r>
+                              <m:r>
+                                <a:rPr lang="en-US" i="1">
+                                  <a:latin typeface="Cambria Math" panose="02040503050406030204" pitchFamily="18" charset="0"/>
+                                  <a:ea typeface="Cambria Math" panose="02040503050406030204" pitchFamily="18" charset="0"/>
+                                </a:rPr>
+                                <m:t>1</m:t>
+                              </m:r>
+                              <m:r>
+                                <a:rPr lang="en-US" i="1">
+                                  <a:latin typeface="Cambria Math" panose="02040503050406030204" pitchFamily="18" charset="0"/>
+                                  <a:ea typeface="Cambria Math" panose="02040503050406030204" pitchFamily="18" charset="0"/>
+                                </a:rPr>
+                                <m:t> | </m:t>
+                              </m:r>
+                              <m:r>
+                                <a:rPr lang="en-US" i="1">
+                                  <a:latin typeface="Cambria Math" panose="02040503050406030204" pitchFamily="18" charset="0"/>
+                                  <a:ea typeface="Cambria Math" panose="02040503050406030204" pitchFamily="18" charset="0"/>
+                                </a:rPr>
+                                <m:t>𝑋</m:t>
+                              </m:r>
+                            </m:e>
+                          </m:d>
+                          <m:r>
+                            <a:rPr lang="en-US" i="1">
+                              <a:latin typeface="Cambria Math" panose="02040503050406030204" pitchFamily="18" charset="0"/>
+                            </a:rPr>
+                            <m:t>=</m:t>
+                          </m:r>
+                          <m:r>
+                            <a:rPr lang="en-US">
+                              <a:latin typeface="Cambria Math" panose="02040503050406030204" pitchFamily="18" charset="0"/>
+                            </a:rPr>
+                            <m:t>0</m:t>
+                          </m:r>
+                          <m:r>
+                            <a:rPr lang="en-US">
+                              <a:latin typeface="Cambria Math" panose="02040503050406030204" pitchFamily="18" charset="0"/>
+                            </a:rPr>
+                            <m:t>.</m:t>
+                          </m:r>
+                          <m:r>
+                            <a:rPr lang="en-US" i="1">
+                              <a:latin typeface="Cambria Math" panose="02040503050406030204" pitchFamily="18" charset="0"/>
+                            </a:rPr>
+                            <m:t>5</m:t>
+                          </m:r>
+                        </m:e>
+                        <m:lim>
+                          <m:r>
+                            <a:rPr lang="en-US" b="0" i="1" smtClean="0">
+                              <a:latin typeface="Cambria Math" panose="02040503050406030204" pitchFamily="18" charset="0"/>
+                            </a:rPr>
+                            <m:t>𝑝𝑟𝑖𝑜𝑟</m:t>
+                          </m:r>
+                          <m:r>
+                            <a:rPr lang="en-US" b="0" i="1" smtClean="0">
+                              <a:latin typeface="Cambria Math" panose="02040503050406030204" pitchFamily="18" charset="0"/>
+                            </a:rPr>
+                            <m:t> </m:t>
+                          </m:r>
+                          <m:r>
+                            <a:rPr lang="en-US" b="0" i="1" smtClean="0">
+                              <a:latin typeface="Cambria Math" panose="02040503050406030204" pitchFamily="18" charset="0"/>
+                            </a:rPr>
+                            <m:t>𝑏𝑒𝑙𝑖𝑒𝑓</m:t>
+                          </m:r>
+                        </m:lim>
+                      </m:limLow>
+                      <m:func>
+                        <m:funcPr>
+                          <m:ctrlPr>
+                            <a:rPr lang="en-US" b="0" i="1" smtClean="0">
+                              <a:latin typeface="Cambria Math" panose="02040503050406030204" pitchFamily="18" charset="0"/>
+                            </a:rPr>
+                          </m:ctrlPr>
+                        </m:funcPr>
+                        <m:fName>
+                          <m:limLow>
+                            <m:limLowPr>
+                              <m:ctrlPr>
+                                <a:rPr lang="en-US" b="0" i="1" smtClean="0">
+                                  <a:latin typeface="Cambria Math" panose="02040503050406030204" pitchFamily="18" charset="0"/>
+                                </a:rPr>
+                              </m:ctrlPr>
+                            </m:limLowPr>
+                            <m:e>
+                              <m:r>
+                                <a:rPr lang="en-US" smtClean="0">
+                                  <a:latin typeface="Cambria Math" panose="02040503050406030204" pitchFamily="18" charset="0"/>
+                                  <a:ea typeface="Cambria Math" panose="02040503050406030204" pitchFamily="18" charset="0"/>
+                                </a:rPr>
+                                <m:t>⟹</m:t>
+                              </m:r>
+                            </m:e>
+                            <m:lim>
+                              <m:r>
+                                <a:rPr lang="en-US" b="0" i="1" smtClean="0">
+                                  <a:latin typeface="Cambria Math" panose="02040503050406030204" pitchFamily="18" charset="0"/>
+                                </a:rPr>
+                                <m:t>𝑛𝑒𝑤</m:t>
+                              </m:r>
+                              <m:r>
+                                <a:rPr lang="en-US" b="0" i="1" smtClean="0">
+                                  <a:latin typeface="Cambria Math" panose="02040503050406030204" pitchFamily="18" charset="0"/>
+                                </a:rPr>
+                                <m:t> </m:t>
+                              </m:r>
+                              <m:r>
+                                <a:rPr lang="en-US" b="0" i="1" smtClean="0">
+                                  <a:latin typeface="Cambria Math" panose="02040503050406030204" pitchFamily="18" charset="0"/>
+                                </a:rPr>
+                                <m:t>𝑒𝑣𝑖𝑑𝑒𝑛𝑐𝑒</m:t>
+                              </m:r>
+                            </m:lim>
+                          </m:limLow>
+                        </m:fName>
+                        <m:e>
+                          <m:r>
+                            <a:rPr lang="en-US" b="0" i="1" smtClean="0">
+                              <a:latin typeface="Cambria Math" panose="02040503050406030204" pitchFamily="18" charset="0"/>
+                            </a:rPr>
+                            <m:t> </m:t>
+                          </m:r>
+                        </m:e>
+                      </m:func>
+                      <m:limLow>
+                        <m:limLowPr>
+                          <m:ctrlPr>
+                            <a:rPr lang="en-US" i="1">
+                              <a:latin typeface="Cambria Math" panose="02040503050406030204" pitchFamily="18" charset="0"/>
+                            </a:rPr>
+                          </m:ctrlPr>
+                        </m:limLowPr>
+                        <m:e>
+                          <m:r>
+                            <a:rPr lang="ar-AE" i="1">
+                              <a:latin typeface="Cambria Math" panose="02040503050406030204" pitchFamily="18" charset="0"/>
+                            </a:rPr>
+                            <m:t>𝑃</m:t>
+                          </m:r>
+                          <m:d>
+                            <m:dPr>
+                              <m:ctrlPr>
+                                <a:rPr lang="ar-AE" i="1">
+                                  <a:latin typeface="Cambria Math" panose="02040503050406030204" pitchFamily="18" charset="0"/>
+                                </a:rPr>
+                              </m:ctrlPr>
+                            </m:dPr>
+                            <m:e>
+                              <m:r>
+                                <a:rPr lang="ar-AE" i="1">
+                                  <a:latin typeface="Cambria Math" panose="02040503050406030204" pitchFamily="18" charset="0"/>
+                                  <a:ea typeface="Cambria Math" panose="02040503050406030204" pitchFamily="18" charset="0"/>
+                                </a:rPr>
+                                <m:t>𝜃</m:t>
+                              </m:r>
+                              <m:r>
+                                <a:rPr lang="ar-AE" i="1">
+                                  <a:latin typeface="Cambria Math" panose="02040503050406030204" pitchFamily="18" charset="0"/>
+                                  <a:ea typeface="Cambria Math" panose="02040503050406030204" pitchFamily="18" charset="0"/>
+                                </a:rPr>
+                                <m:t>=</m:t>
+                              </m:r>
+                              <m:r>
+                                <a:rPr lang="ar-AE" i="1">
+                                  <a:latin typeface="Cambria Math" panose="02040503050406030204" pitchFamily="18" charset="0"/>
+                                  <a:ea typeface="Cambria Math" panose="02040503050406030204" pitchFamily="18" charset="0"/>
+                                </a:rPr>
+                                <m:t>1</m:t>
+                              </m:r>
+                              <m:r>
+                                <a:rPr lang="ar-AE" i="1">
+                                  <a:latin typeface="Cambria Math" panose="02040503050406030204" pitchFamily="18" charset="0"/>
+                                  <a:ea typeface="Cambria Math" panose="02040503050406030204" pitchFamily="18" charset="0"/>
+                                </a:rPr>
+                                <m:t> | </m:t>
+                              </m:r>
+                              <m:r>
+                                <a:rPr lang="ar-AE" i="1">
+                                  <a:latin typeface="Cambria Math" panose="02040503050406030204" pitchFamily="18" charset="0"/>
+                                  <a:ea typeface="Cambria Math" panose="02040503050406030204" pitchFamily="18" charset="0"/>
+                                </a:rPr>
+                                <m:t>𝑋</m:t>
+                              </m:r>
+                            </m:e>
+                          </m:d>
+                          <m:r>
+                            <a:rPr lang="ar-AE" i="1">
+                              <a:latin typeface="Cambria Math" panose="02040503050406030204" pitchFamily="18" charset="0"/>
+                            </a:rPr>
+                            <m:t>=</m:t>
+                          </m:r>
+                          <m:r>
+                            <a:rPr lang="ar-AE">
+                              <a:latin typeface="Cambria Math" panose="02040503050406030204" pitchFamily="18" charset="0"/>
+                            </a:rPr>
+                            <m:t>0</m:t>
+                          </m:r>
+                          <m:r>
+                            <a:rPr lang="ar-AE">
+                              <a:latin typeface="Cambria Math" panose="02040503050406030204" pitchFamily="18" charset="0"/>
+                            </a:rPr>
+                            <m:t>.</m:t>
+                          </m:r>
+                          <m:r>
+                            <a:rPr lang="en-US">
+                              <a:latin typeface="Cambria Math" panose="02040503050406030204" pitchFamily="18" charset="0"/>
+                            </a:rPr>
+                            <m:t>2</m:t>
+                          </m:r>
+                          <m:r>
+                            <m:rPr>
+                              <m:nor/>
+                            </m:rPr>
+                            <a:rPr lang="ar-AE" dirty="0"/>
+                            <m:t> </m:t>
+                          </m:r>
+                        </m:e>
+                        <m:lim>
+                          <m:r>
+                            <a:rPr lang="en-US" i="1">
+                              <a:latin typeface="Cambria Math" panose="02040503050406030204" pitchFamily="18" charset="0"/>
+                            </a:rPr>
+                            <m:t>𝑛𝑒𝑤</m:t>
+                          </m:r>
+                          <m:r>
+                            <a:rPr lang="en-US" b="0" i="1" smtClean="0">
+                              <a:latin typeface="Cambria Math" panose="02040503050406030204" pitchFamily="18" charset="0"/>
+                            </a:rPr>
+                            <m:t> </m:t>
+                          </m:r>
+                          <m:r>
+                            <a:rPr lang="en-US" b="0" i="1" smtClean="0">
+                              <a:latin typeface="Cambria Math" panose="02040503050406030204" pitchFamily="18" charset="0"/>
+                            </a:rPr>
+                            <m:t>𝑏𝑒𝑙𝑖𝑒𝑓</m:t>
+                          </m:r>
+                        </m:lim>
+                      </m:limLow>
+                    </m:oMath>
+                  </m:oMathPara>
+                </a14:m>
                 <a:endParaRPr dirty="0"/>
               </a:p>
             </p:txBody>
           </p:sp>
         </mc:Choice>
-        <mc:Fallback xmlns="">
+        <mc:Fallback>
           <p:sp>
             <p:nvSpPr>
               <p:cNvPr id="3" name="Content Placeholder 2"/>
@@ -9000,10 +10112,14 @@
               </p:nvPr>
             </p:nvSpPr>
             <p:spPr>
+              <a:xfrm>
+                <a:off x="457200" y="1063229"/>
+                <a:ext cx="8229600" cy="3879849"/>
+              </a:xfrm>
               <a:blipFill>
                 <a:blip r:embed="rId2"/>
                 <a:stretch>
-                  <a:fillRect l="-1111" t="-1436" r="-741" b="-1795"/>
+                  <a:fillRect l="-1111" t="-2198"/>
                 </a:stretch>
               </a:blipFill>
             </p:spPr>
@@ -11596,8 +12712,8 @@
           </a:p>
         </p:txBody>
       </p:sp>
-      <mc:AlternateContent xmlns:mc="http://schemas.openxmlformats.org/markup-compatibility/2006">
-        <mc:Choice xmlns:a14="http://schemas.microsoft.com/office/drawing/2010/main" Requires="a14">
+      <mc:AlternateContent xmlns:mc="http://schemas.openxmlformats.org/markup-compatibility/2006" xmlns:a14="http://schemas.microsoft.com/office/drawing/2010/main">
+        <mc:Choice Requires="a14">
           <p:sp>
             <p:nvSpPr>
               <p:cNvPr id="3" name="Content Placeholder 2"/>
@@ -11918,7 +13034,7 @@
             </p:txBody>
           </p:sp>
         </mc:Choice>
-        <mc:Fallback>
+        <mc:Fallback xmlns="">
           <p:sp>
             <p:nvSpPr>
               <p:cNvPr id="3" name="Content Placeholder 2"/>
@@ -18718,4 +19834,299 @@
   </a:objectDefaults>
   <a:extraClrSchemeLst/>
 </a:theme>
+</file>
+
+<file path=ppt/theme/theme2.xml><?xml version="1.0" encoding="utf-8"?>
+<a:theme xmlns:a="http://schemas.openxmlformats.org/drawingml/2006/main" name="Office Theme">
+  <a:themeElements>
+    <a:clrScheme name="Office">
+      <a:dk1>
+        <a:sysClr val="windowText" lastClr="000000"/>
+      </a:dk1>
+      <a:lt1>
+        <a:sysClr val="window" lastClr="FFFFFF"/>
+      </a:lt1>
+      <a:dk2>
+        <a:srgbClr val="44546A"/>
+      </a:dk2>
+      <a:lt2>
+        <a:srgbClr val="E7E6E6"/>
+      </a:lt2>
+      <a:accent1>
+        <a:srgbClr val="4472C4"/>
+      </a:accent1>
+      <a:accent2>
+        <a:srgbClr val="ED7D31"/>
+      </a:accent2>
+      <a:accent3>
+        <a:srgbClr val="A5A5A5"/>
+      </a:accent3>
+      <a:accent4>
+        <a:srgbClr val="FFC000"/>
+      </a:accent4>
+      <a:accent5>
+        <a:srgbClr val="5B9BD5"/>
+      </a:accent5>
+      <a:accent6>
+        <a:srgbClr val="70AD47"/>
+      </a:accent6>
+      <a:hlink>
+        <a:srgbClr val="0563C1"/>
+      </a:hlink>
+      <a:folHlink>
+        <a:srgbClr val="954F72"/>
+      </a:folHlink>
+    </a:clrScheme>
+    <a:fontScheme name="Office">
+      <a:majorFont>
+        <a:latin typeface="Calibri Light" panose="020F0302020204030204"/>
+        <a:ea typeface=""/>
+        <a:cs typeface=""/>
+        <a:font script="Jpan" typeface="游ゴシック Light"/>
+        <a:font script="Hang" typeface="맑은 고딕"/>
+        <a:font script="Hans" typeface="等线 Light"/>
+        <a:font script="Hant" typeface="新細明體"/>
+        <a:font script="Arab" typeface="Times New Roman"/>
+        <a:font script="Hebr" typeface="Times New Roman"/>
+        <a:font script="Thai" typeface="Angsana New"/>
+        <a:font script="Ethi" typeface="Nyala"/>
+        <a:font script="Beng" typeface="Vrinda"/>
+        <a:font script="Gujr" typeface="Shruti"/>
+        <a:font script="Khmr" typeface="MoolBoran"/>
+        <a:font script="Knda" typeface="Tunga"/>
+        <a:font script="Guru" typeface="Raavi"/>
+        <a:font script="Cans" typeface="Euphemia"/>
+        <a:font script="Cher" typeface="Plantagenet Cherokee"/>
+        <a:font script="Yiii" typeface="Microsoft Yi Baiti"/>
+        <a:font script="Tibt" typeface="Microsoft Himalaya"/>
+        <a:font script="Thaa" typeface="MV Boli"/>
+        <a:font script="Deva" typeface="Mangal"/>
+        <a:font script="Telu" typeface="Gautami"/>
+        <a:font script="Taml" typeface="Latha"/>
+        <a:font script="Syrc" typeface="Estrangelo Edessa"/>
+        <a:font script="Orya" typeface="Kalinga"/>
+        <a:font script="Mlym" typeface="Kartika"/>
+        <a:font script="Laoo" typeface="DokChampa"/>
+        <a:font script="Sinh" typeface="Iskoola Pota"/>
+        <a:font script="Mong" typeface="Mongolian Baiti"/>
+        <a:font script="Viet" typeface="Times New Roman"/>
+        <a:font script="Uigh" typeface="Microsoft Uighur"/>
+        <a:font script="Geor" typeface="Sylfaen"/>
+        <a:font script="Armn" typeface="Arial"/>
+        <a:font script="Bugi" typeface="Leelawadee UI"/>
+        <a:font script="Bopo" typeface="Microsoft JhengHei"/>
+        <a:font script="Java" typeface="Javanese Text"/>
+        <a:font script="Lisu" typeface="Segoe UI"/>
+        <a:font script="Mymr" typeface="Myanmar Text"/>
+        <a:font script="Nkoo" typeface="Ebrima"/>
+        <a:font script="Olck" typeface="Nirmala UI"/>
+        <a:font script="Osma" typeface="Ebrima"/>
+        <a:font script="Phag" typeface="Phagspa"/>
+        <a:font script="Syrn" typeface="Estrangelo Edessa"/>
+        <a:font script="Syrj" typeface="Estrangelo Edessa"/>
+        <a:font script="Syre" typeface="Estrangelo Edessa"/>
+        <a:font script="Sora" typeface="Nirmala UI"/>
+        <a:font script="Tale" typeface="Microsoft Tai Le"/>
+        <a:font script="Talu" typeface="Microsoft New Tai Lue"/>
+        <a:font script="Tfng" typeface="Ebrima"/>
+      </a:majorFont>
+      <a:minorFont>
+        <a:latin typeface="Calibri" panose="020F0502020204030204"/>
+        <a:ea typeface=""/>
+        <a:cs typeface=""/>
+        <a:font script="Jpan" typeface="游ゴシック"/>
+        <a:font script="Hang" typeface="맑은 고딕"/>
+        <a:font script="Hans" typeface="等线"/>
+        <a:font script="Hant" typeface="新細明體"/>
+        <a:font script="Arab" typeface="Arial"/>
+        <a:font script="Hebr" typeface="Arial"/>
+        <a:font script="Thai" typeface="Cordia New"/>
+        <a:font script="Ethi" typeface="Nyala"/>
+        <a:font script="Beng" typeface="Vrinda"/>
+        <a:font script="Gujr" typeface="Shruti"/>
+        <a:font script="Khmr" typeface="DaunPenh"/>
+        <a:font script="Knda" typeface="Tunga"/>
+        <a:font script="Guru" typeface="Raavi"/>
+        <a:font script="Cans" typeface="Euphemia"/>
+        <a:font script="Cher" typeface="Plantagenet Cherokee"/>
+        <a:font script="Yiii" typeface="Microsoft Yi Baiti"/>
+        <a:font script="Tibt" typeface="Microsoft Himalaya"/>
+        <a:font script="Thaa" typeface="MV Boli"/>
+        <a:font script="Deva" typeface="Mangal"/>
+        <a:font script="Telu" typeface="Gautami"/>
+        <a:font script="Taml" typeface="Latha"/>
+        <a:font script="Syrc" typeface="Estrangelo Edessa"/>
+        <a:font script="Orya" typeface="Kalinga"/>
+        <a:font script="Mlym" typeface="Kartika"/>
+        <a:font script="Laoo" typeface="DokChampa"/>
+        <a:font script="Sinh" typeface="Iskoola Pota"/>
+        <a:font script="Mong" typeface="Mongolian Baiti"/>
+        <a:font script="Viet" typeface="Arial"/>
+        <a:font script="Uigh" typeface="Microsoft Uighur"/>
+        <a:font script="Geor" typeface="Sylfaen"/>
+        <a:font script="Armn" typeface="Arial"/>
+        <a:font script="Bugi" typeface="Leelawadee UI"/>
+        <a:font script="Bopo" typeface="Microsoft JhengHei"/>
+        <a:font script="Java" typeface="Javanese Text"/>
+        <a:font script="Lisu" typeface="Segoe UI"/>
+        <a:font script="Mymr" typeface="Myanmar Text"/>
+        <a:font script="Nkoo" typeface="Ebrima"/>
+        <a:font script="Olck" typeface="Nirmala UI"/>
+        <a:font script="Osma" typeface="Ebrima"/>
+        <a:font script="Phag" typeface="Phagspa"/>
+        <a:font script="Syrn" typeface="Estrangelo Edessa"/>
+        <a:font script="Syrj" typeface="Estrangelo Edessa"/>
+        <a:font script="Syre" typeface="Estrangelo Edessa"/>
+        <a:font script="Sora" typeface="Nirmala UI"/>
+        <a:font script="Tale" typeface="Microsoft Tai Le"/>
+        <a:font script="Talu" typeface="Microsoft New Tai Lue"/>
+        <a:font script="Tfng" typeface="Ebrima"/>
+      </a:minorFont>
+    </a:fontScheme>
+    <a:fmtScheme name="Office">
+      <a:fillStyleLst>
+        <a:solidFill>
+          <a:schemeClr val="phClr"/>
+        </a:solidFill>
+        <a:gradFill rotWithShape="1">
+          <a:gsLst>
+            <a:gs pos="0">
+              <a:schemeClr val="phClr">
+                <a:lumMod val="110000"/>
+                <a:satMod val="105000"/>
+                <a:tint val="67000"/>
+              </a:schemeClr>
+            </a:gs>
+            <a:gs pos="50000">
+              <a:schemeClr val="phClr">
+                <a:lumMod val="105000"/>
+                <a:satMod val="103000"/>
+                <a:tint val="73000"/>
+              </a:schemeClr>
+            </a:gs>
+            <a:gs pos="100000">
+              <a:schemeClr val="phClr">
+                <a:lumMod val="105000"/>
+                <a:satMod val="109000"/>
+                <a:tint val="81000"/>
+              </a:schemeClr>
+            </a:gs>
+          </a:gsLst>
+          <a:lin ang="5400000" scaled="0"/>
+        </a:gradFill>
+        <a:gradFill rotWithShape="1">
+          <a:gsLst>
+            <a:gs pos="0">
+              <a:schemeClr val="phClr">
+                <a:satMod val="103000"/>
+                <a:lumMod val="102000"/>
+                <a:tint val="94000"/>
+              </a:schemeClr>
+            </a:gs>
+            <a:gs pos="50000">
+              <a:schemeClr val="phClr">
+                <a:satMod val="110000"/>
+                <a:lumMod val="100000"/>
+                <a:shade val="100000"/>
+              </a:schemeClr>
+            </a:gs>
+            <a:gs pos="100000">
+              <a:schemeClr val="phClr">
+                <a:lumMod val="99000"/>
+                <a:satMod val="120000"/>
+                <a:shade val="78000"/>
+              </a:schemeClr>
+            </a:gs>
+          </a:gsLst>
+          <a:lin ang="5400000" scaled="0"/>
+        </a:gradFill>
+      </a:fillStyleLst>
+      <a:lnStyleLst>
+        <a:ln w="6350" cap="flat" cmpd="sng" algn="ctr">
+          <a:solidFill>
+            <a:schemeClr val="phClr"/>
+          </a:solidFill>
+          <a:prstDash val="solid"/>
+          <a:miter lim="800000"/>
+        </a:ln>
+        <a:ln w="12700" cap="flat" cmpd="sng" algn="ctr">
+          <a:solidFill>
+            <a:schemeClr val="phClr"/>
+          </a:solidFill>
+          <a:prstDash val="solid"/>
+          <a:miter lim="800000"/>
+        </a:ln>
+        <a:ln w="19050" cap="flat" cmpd="sng" algn="ctr">
+          <a:solidFill>
+            <a:schemeClr val="phClr"/>
+          </a:solidFill>
+          <a:prstDash val="solid"/>
+          <a:miter lim="800000"/>
+        </a:ln>
+      </a:lnStyleLst>
+      <a:effectStyleLst>
+        <a:effectStyle>
+          <a:effectLst/>
+        </a:effectStyle>
+        <a:effectStyle>
+          <a:effectLst/>
+        </a:effectStyle>
+        <a:effectStyle>
+          <a:effectLst>
+            <a:outerShdw blurRad="57150" dist="19050" dir="5400000" algn="ctr" rotWithShape="0">
+              <a:srgbClr val="000000">
+                <a:alpha val="63000"/>
+              </a:srgbClr>
+            </a:outerShdw>
+          </a:effectLst>
+        </a:effectStyle>
+      </a:effectStyleLst>
+      <a:bgFillStyleLst>
+        <a:solidFill>
+          <a:schemeClr val="phClr"/>
+        </a:solidFill>
+        <a:solidFill>
+          <a:schemeClr val="phClr">
+            <a:tint val="95000"/>
+            <a:satMod val="170000"/>
+          </a:schemeClr>
+        </a:solidFill>
+        <a:gradFill rotWithShape="1">
+          <a:gsLst>
+            <a:gs pos="0">
+              <a:schemeClr val="phClr">
+                <a:tint val="93000"/>
+                <a:satMod val="150000"/>
+                <a:shade val="98000"/>
+                <a:lumMod val="102000"/>
+              </a:schemeClr>
+            </a:gs>
+            <a:gs pos="50000">
+              <a:schemeClr val="phClr">
+                <a:tint val="98000"/>
+                <a:satMod val="130000"/>
+                <a:shade val="90000"/>
+                <a:lumMod val="103000"/>
+              </a:schemeClr>
+            </a:gs>
+            <a:gs pos="100000">
+              <a:schemeClr val="phClr">
+                <a:shade val="63000"/>
+                <a:satMod val="120000"/>
+              </a:schemeClr>
+            </a:gs>
+          </a:gsLst>
+          <a:lin ang="5400000" scaled="0"/>
+        </a:gradFill>
+      </a:bgFillStyleLst>
+    </a:fmtScheme>
+  </a:themeElements>
+  <a:objectDefaults/>
+  <a:extraClrSchemeLst/>
+  <a:extLst>
+    <a:ext uri="{05A4C25C-085E-4340-85A3-A5531E510DB2}">
+      <thm15:themeFamily xmlns:thm15="http://schemas.microsoft.com/office/thememl/2012/main" name="Office Theme" id="{62F939B6-93AF-4DB8-9C6B-D6C7DFDC589F}" vid="{4A3C46E8-61CC-4603-A589-7422A47A8E4A}"/>
+    </a:ext>
+  </a:extLst>
+</a:theme>
 </file>
</xml_diff>

<commit_message>
corrected plot function in chapter 14 notebook and tested notebooks
</commit_message>
<xml_diff>
--- a/LectureSlides/03b_WhenOneThingDependsOnAother.pptx
+++ b/LectureSlides/03b_WhenOneThingDependsOnAother.pptx
@@ -6744,7 +6744,11 @@
                 <a:pPr lvl="1"/>
                 <a:r>
                   <a:rPr lang="en-US" sz="2300" dirty="0"/>
-                  <a:t>One X chromosome inherited from each parent</a:t>
+                  <a:t>One X chromosome inherited from each parent, </a:t>
+                </a:r>
+                <a:r>
+                  <a:rPr lang="en-US" sz="2300" b="1" dirty="0"/>
+                  <a:t>independent events </a:t>
                 </a:r>
               </a:p>
               <a:p>
@@ -7308,8 +7312,8 @@
           </a:p>
         </p:txBody>
       </p:sp>
-      <mc:AlternateContent xmlns:mc="http://schemas.openxmlformats.org/markup-compatibility/2006">
-        <mc:Choice xmlns:a14="http://schemas.microsoft.com/office/drawing/2010/main" Requires="a14">
+      <mc:AlternateContent xmlns:mc="http://schemas.openxmlformats.org/markup-compatibility/2006" xmlns:a14="http://schemas.microsoft.com/office/drawing/2010/main">
+        <mc:Choice Requires="a14">
           <p:sp>
             <p:nvSpPr>
               <p:cNvPr id="3" name="Content Placeholder 2"/>
@@ -8223,7 +8227,7 @@
             </p:txBody>
           </p:sp>
         </mc:Choice>
-        <mc:Fallback>
+        <mc:Fallback xmlns="">
           <p:sp>
             <p:nvSpPr>
               <p:cNvPr id="3" name="Content Placeholder 2"/>
@@ -8310,8 +8314,8 @@
           </a:p>
         </p:txBody>
       </p:sp>
-      <mc:AlternateContent xmlns:mc="http://schemas.openxmlformats.org/markup-compatibility/2006">
-        <mc:Choice xmlns:a14="http://schemas.microsoft.com/office/drawing/2010/main" Requires="a14">
+      <mc:AlternateContent xmlns:mc="http://schemas.openxmlformats.org/markup-compatibility/2006" xmlns:a14="http://schemas.microsoft.com/office/drawing/2010/main">
+        <mc:Choice Requires="a14">
           <p:sp>
             <p:nvSpPr>
               <p:cNvPr id="3" name="Content Placeholder 2"/>
@@ -9013,7 +9017,7 @@
             </p:txBody>
           </p:sp>
         </mc:Choice>
-        <mc:Fallback>
+        <mc:Fallback xmlns="">
           <p:sp>
             <p:nvSpPr>
               <p:cNvPr id="3" name="Content Placeholder 2"/>
@@ -9096,8 +9100,8 @@
           </a:p>
         </p:txBody>
       </p:sp>
-      <mc:AlternateContent xmlns:mc="http://schemas.openxmlformats.org/markup-compatibility/2006">
-        <mc:Choice xmlns:a14="http://schemas.microsoft.com/office/drawing/2010/main" Requires="a14">
+      <mc:AlternateContent xmlns:mc="http://schemas.openxmlformats.org/markup-compatibility/2006" xmlns:a14="http://schemas.microsoft.com/office/drawing/2010/main">
+        <mc:Choice Requires="a14">
           <p:sp>
             <p:nvSpPr>
               <p:cNvPr id="3" name="Content Placeholder 2"/>
@@ -10100,7 +10104,7 @@
             </p:txBody>
           </p:sp>
         </mc:Choice>
-        <mc:Fallback>
+        <mc:Fallback xmlns="">
           <p:sp>
             <p:nvSpPr>
               <p:cNvPr id="3" name="Content Placeholder 2"/>

</xml_diff>